<commit_message>
walkability indicators graphic adjusted
</commit_message>
<xml_diff>
--- a/static/images/docs/walkability_index/indicators.pptx
+++ b/static/images/docs/walkability_index/indicators.pptx
@@ -109,6 +109,11 @@
       </a:defRPr>
     </a:lvl9pPr>
   </p:defaultTextStyle>
+  <p:extLst>
+    <p:ext uri="{EFAFB233-063F-42B5-8137-9DF3F51BA10A}">
+      <p15:sldGuideLst xmlns:p15="http://schemas.microsoft.com/office/powerpoint/2012/main"/>
+    </p:ext>
+  </p:extLst>
 </p:presentation>
 </file>
 
@@ -194,7 +199,7 @@
           <a:p>
             <a:fld id="{7D7CEF10-F7B3-4039-B487-CD1E9C0EBD31}" type="datetimeFigureOut">
               <a:rPr lang="en-US" smtClean="0"/>
-              <a:t>6/26/2021</a:t>
+              <a:t>7/23/2021</a:t>
             </a:fld>
             <a:endParaRPr lang="en-US"/>
           </a:p>
@@ -889,7 +894,7 @@
           <a:p>
             <a:fld id="{C2E69A81-7A2C-4054-8003-E3097BC7B45E}" type="datetimeFigureOut">
               <a:rPr lang="en-US" smtClean="0"/>
-              <a:t>6/26/2021</a:t>
+              <a:t>7/23/2021</a:t>
             </a:fld>
             <a:endParaRPr lang="en-US"/>
           </a:p>
@@ -1059,7 +1064,7 @@
           <a:p>
             <a:fld id="{C2E69A81-7A2C-4054-8003-E3097BC7B45E}" type="datetimeFigureOut">
               <a:rPr lang="en-US" smtClean="0"/>
-              <a:t>6/26/2021</a:t>
+              <a:t>7/23/2021</a:t>
             </a:fld>
             <a:endParaRPr lang="en-US"/>
           </a:p>
@@ -1239,7 +1244,7 @@
           <a:p>
             <a:fld id="{C2E69A81-7A2C-4054-8003-E3097BC7B45E}" type="datetimeFigureOut">
               <a:rPr lang="en-US" smtClean="0"/>
-              <a:t>6/26/2021</a:t>
+              <a:t>7/23/2021</a:t>
             </a:fld>
             <a:endParaRPr lang="en-US"/>
           </a:p>
@@ -4227,7 +4232,7 @@
           <a:p>
             <a:fld id="{C2E69A81-7A2C-4054-8003-E3097BC7B45E}" type="datetimeFigureOut">
               <a:rPr lang="en-US" smtClean="0"/>
-              <a:t>6/26/2021</a:t>
+              <a:t>7/23/2021</a:t>
             </a:fld>
             <a:endParaRPr lang="en-US"/>
           </a:p>
@@ -6461,7 +6466,7 @@
           <a:p>
             <a:fld id="{C2E69A81-7A2C-4054-8003-E3097BC7B45E}" type="datetimeFigureOut">
               <a:rPr lang="en-US" smtClean="0"/>
-              <a:t>6/26/2021</a:t>
+              <a:t>7/23/2021</a:t>
             </a:fld>
             <a:endParaRPr lang="en-US"/>
           </a:p>
@@ -6693,7 +6698,7 @@
           <a:p>
             <a:fld id="{C2E69A81-7A2C-4054-8003-E3097BC7B45E}" type="datetimeFigureOut">
               <a:rPr lang="en-US" smtClean="0"/>
-              <a:t>6/26/2021</a:t>
+              <a:t>7/23/2021</a:t>
             </a:fld>
             <a:endParaRPr lang="en-US"/>
           </a:p>
@@ -7060,7 +7065,7 @@
           <a:p>
             <a:fld id="{C2E69A81-7A2C-4054-8003-E3097BC7B45E}" type="datetimeFigureOut">
               <a:rPr lang="en-US" smtClean="0"/>
-              <a:t>6/26/2021</a:t>
+              <a:t>7/23/2021</a:t>
             </a:fld>
             <a:endParaRPr lang="en-US"/>
           </a:p>
@@ -7178,7 +7183,7 @@
           <a:p>
             <a:fld id="{C2E69A81-7A2C-4054-8003-E3097BC7B45E}" type="datetimeFigureOut">
               <a:rPr lang="en-US" smtClean="0"/>
-              <a:t>6/26/2021</a:t>
+              <a:t>7/23/2021</a:t>
             </a:fld>
             <a:endParaRPr lang="en-US"/>
           </a:p>
@@ -7273,7 +7278,7 @@
           <a:p>
             <a:fld id="{C2E69A81-7A2C-4054-8003-E3097BC7B45E}" type="datetimeFigureOut">
               <a:rPr lang="en-US" smtClean="0"/>
-              <a:t>6/26/2021</a:t>
+              <a:t>7/23/2021</a:t>
             </a:fld>
             <a:endParaRPr lang="en-US"/>
           </a:p>
@@ -7550,7 +7555,7 @@
           <a:p>
             <a:fld id="{C2E69A81-7A2C-4054-8003-E3097BC7B45E}" type="datetimeFigureOut">
               <a:rPr lang="en-US" smtClean="0"/>
-              <a:t>6/26/2021</a:t>
+              <a:t>7/23/2021</a:t>
             </a:fld>
             <a:endParaRPr lang="en-US"/>
           </a:p>
@@ -7803,7 +7808,7 @@
           <a:p>
             <a:fld id="{C2E69A81-7A2C-4054-8003-E3097BC7B45E}" type="datetimeFigureOut">
               <a:rPr lang="en-US" smtClean="0"/>
-              <a:t>6/26/2021</a:t>
+              <a:t>7/23/2021</a:t>
             </a:fld>
             <a:endParaRPr lang="en-US"/>
           </a:p>
@@ -8016,7 +8021,7 @@
           <a:p>
             <a:fld id="{C2E69A81-7A2C-4054-8003-E3097BC7B45E}" type="datetimeFigureOut">
               <a:rPr lang="en-US" smtClean="0"/>
-              <a:t>6/26/2021</a:t>
+              <a:t>7/23/2021</a:t>
             </a:fld>
             <a:endParaRPr lang="en-US"/>
           </a:p>
@@ -9070,76 +9075,6 @@
       </p:grpSpPr>
       <p:sp>
         <p:nvSpPr>
-          <p:cNvPr id="41" name="Fußzeilenplatzhalter 40"/>
-          <p:cNvSpPr>
-            <a:spLocks noGrp="1"/>
-          </p:cNvSpPr>
-          <p:nvPr>
-            <p:ph type="ftr" sz="quarter" idx="3"/>
-          </p:nvPr>
-        </p:nvSpPr>
-        <p:spPr/>
-        <p:txBody>
-          <a:bodyPr/>
-          <a:lstStyle/>
-          <a:p>
-            <a:pPr marL="0" marR="0" lvl="0" indent="0" algn="l" defTabSz="914400" rtl="0" eaLnBrk="1" fontAlgn="auto" latinLnBrk="0" hangingPunct="1">
-              <a:lnSpc>
-                <a:spcPct val="100000"/>
-              </a:lnSpc>
-              <a:spcBef>
-                <a:spcPts val="0"/>
-              </a:spcBef>
-              <a:spcAft>
-                <a:spcPts val="0"/>
-              </a:spcAft>
-              <a:buClrTx/>
-              <a:buSzTx/>
-              <a:buFontTx/>
-              <a:buNone/>
-              <a:tabLst/>
-              <a:defRPr/>
-            </a:pPr>
-            <a:r>
-              <a:rPr kumimoji="0" lang="en-US" sz="1100" b="0" i="0" u="none" strike="noStrike" kern="1200" cap="none" spc="0" normalizeH="0" baseline="0" noProof="0" smtClean="0">
-                <a:ln>
-                  <a:noFill/>
-                </a:ln>
-                <a:solidFill>
-                  <a:prstClr val="black">
-                    <a:tint val="75000"/>
-                  </a:prstClr>
-                </a:solidFill>
-                <a:effectLst/>
-                <a:uLnTx/>
-                <a:uFillTx/>
-                <a:latin typeface="Mulish Light"/>
-                <a:ea typeface="+mn-ea"/>
-                <a:cs typeface="+mn-cs"/>
-              </a:rPr>
-              <a:t>Dresdner Flächennutzungssymposium 2021, 28.-29.06.2021 | Ulrike Jehle | Plan4Better</a:t>
-            </a:r>
-            <a:endParaRPr kumimoji="0" lang="en-US" sz="1100" b="0" i="0" u="none" strike="noStrike" kern="1200" cap="none" spc="0" normalizeH="0" baseline="0" noProof="0">
-              <a:ln>
-                <a:noFill/>
-              </a:ln>
-              <a:solidFill>
-                <a:prstClr val="black">
-                  <a:tint val="75000"/>
-                </a:prstClr>
-              </a:solidFill>
-              <a:effectLst/>
-              <a:uLnTx/>
-              <a:uFillTx/>
-              <a:latin typeface="Mulish Light"/>
-              <a:ea typeface="+mn-ea"/>
-              <a:cs typeface="+mn-cs"/>
-            </a:endParaRPr>
-          </a:p>
-        </p:txBody>
-      </p:sp>
-      <p:sp>
-        <p:nvSpPr>
           <p:cNvPr id="7" name="Rechteck 6">
             <a:extLst>
               <a:ext uri="{FF2B5EF4-FFF2-40B4-BE49-F238E27FC236}">
@@ -10638,7 +10573,7 @@
               <a:defRPr/>
             </a:pPr>
             <a:r>
-              <a:rPr kumimoji="0" lang="de-DE" sz="1100" b="0" i="0" u="none" strike="noStrike" kern="1200" cap="none" spc="0" normalizeH="0" baseline="0" noProof="0" dirty="0">
+              <a:rPr kumimoji="0" lang="de-DE" sz="1100" b="0" i="0" u="none" strike="noStrike" kern="1200" cap="none" spc="0" normalizeH="0" baseline="0" noProof="0" dirty="0" smtClean="0">
                 <a:ln>
                   <a:noFill/>
                 </a:ln>
@@ -10652,24 +10587,7 @@
                 <a:ea typeface="+mn-ea"/>
                 <a:cs typeface="+mn-cs"/>
               </a:rPr>
-              <a:t>0,056</a:t>
-            </a:r>
-            <a:r>
-              <a:rPr kumimoji="0" lang="de-DE" sz="1100" b="0" i="0" u="none" strike="noStrike" kern="1200" cap="none" spc="0" normalizeH="0" baseline="0" noProof="0" dirty="0" smtClean="0">
-                <a:ln>
-                  <a:noFill/>
-                </a:ln>
-                <a:solidFill>
-                  <a:prstClr val="white"/>
-                </a:solidFill>
-                <a:effectLst/>
-                <a:uLnTx/>
-                <a:uFillTx/>
-                <a:latin typeface="Mulish Light"/>
-                <a:ea typeface="+mn-ea"/>
-                <a:cs typeface="+mn-cs"/>
-              </a:rPr>
-              <a:t>0,028</a:t>
+              <a:t>0,0730,036</a:t>
             </a:r>
             <a:endParaRPr kumimoji="0" lang="de-DE" sz="1100" b="0" i="0" u="none" strike="noStrike" kern="1200" cap="none" spc="0" normalizeH="0" baseline="0" noProof="0" dirty="0">
               <a:ln>
@@ -10719,8 +10637,22 @@
                 <a:ea typeface="+mn-ea"/>
                 <a:cs typeface="+mn-cs"/>
               </a:rPr>
-              <a:t>0,028</a:t>
-            </a:r>
+              <a:t>0,036</a:t>
+            </a:r>
+            <a:endParaRPr kumimoji="0" lang="de-DE" sz="1100" b="0" i="0" u="none" strike="noStrike" kern="1200" cap="none" spc="0" normalizeH="0" baseline="0" noProof="0" dirty="0" smtClean="0">
+              <a:ln>
+                <a:noFill/>
+              </a:ln>
+              <a:solidFill>
+                <a:prstClr val="white"/>
+              </a:solidFill>
+              <a:effectLst/>
+              <a:uLnTx/>
+              <a:uFillTx/>
+              <a:latin typeface="Mulish Light"/>
+              <a:ea typeface="+mn-ea"/>
+              <a:cs typeface="+mn-cs"/>
+            </a:endParaRPr>
           </a:p>
           <a:p>
             <a:pPr marL="0" marR="0" lvl="0" indent="0" algn="l" defTabSz="914400" rtl="0" eaLnBrk="1" fontAlgn="auto" latinLnBrk="0" hangingPunct="1">
@@ -10755,7 +10687,7 @@
                 <a:ea typeface="+mn-ea"/>
                 <a:cs typeface="+mn-cs"/>
               </a:rPr>
-              <a:t>0,028</a:t>
+              <a:t>0,036</a:t>
             </a:r>
             <a:endParaRPr kumimoji="0" lang="de-DE" sz="1100" b="0" i="0" u="none" strike="noStrike" kern="1200" cap="none" spc="0" normalizeH="0" baseline="0" noProof="0" dirty="0">
               <a:ln>
@@ -11190,7 +11122,7 @@
               <a:defRPr/>
             </a:pPr>
             <a:r>
-              <a:rPr kumimoji="0" lang="de-DE" sz="1100" b="0" i="0" u="none" strike="noStrike" kern="1200" cap="none" spc="0" normalizeH="0" baseline="0" noProof="0" dirty="0" smtClean="0">
+              <a:rPr kumimoji="0" lang="en-US" sz="1100" b="0" i="0" u="none" strike="noStrike" kern="1200" cap="none" spc="0" normalizeH="0" baseline="0" noProof="0" dirty="0" smtClean="0">
                 <a:ln>
                   <a:noFill/>
                 </a:ln>
@@ -11204,7 +11136,7 @@
                 <a:ea typeface="+mn-ea"/>
                 <a:cs typeface="+mn-cs"/>
               </a:rPr>
-              <a:t>0,017</a:t>
+              <a:t>0,027</a:t>
             </a:r>
           </a:p>
           <a:p>
@@ -11226,7 +11158,35 @@
               <a:defRPr/>
             </a:pPr>
             <a:r>
-              <a:rPr kumimoji="0" lang="de-DE" sz="1100" b="0" i="0" u="none" strike="noStrike" kern="1200" cap="none" spc="0" normalizeH="0" baseline="0" noProof="0" dirty="0" smtClean="0">
+              <a:rPr lang="en-US" sz="1100" dirty="0" smtClean="0">
+                <a:solidFill>
+                  <a:prstClr val="white"/>
+                </a:solidFill>
+                <a:latin typeface="Mulish Light"/>
+              </a:rPr>
+              <a:t>0,055</a:t>
+            </a:r>
+          </a:p>
+          <a:p>
+            <a:pPr marL="0" marR="0" lvl="0" indent="0" algn="l" defTabSz="914400" rtl="0" eaLnBrk="1" fontAlgn="auto" latinLnBrk="0" hangingPunct="1">
+              <a:lnSpc>
+                <a:spcPct val="100000"/>
+              </a:lnSpc>
+              <a:spcBef>
+                <a:spcPts val="0"/>
+              </a:spcBef>
+              <a:spcAft>
+                <a:spcPts val="0"/>
+              </a:spcAft>
+              <a:buClrTx/>
+              <a:buSzTx/>
+              <a:buFontTx/>
+              <a:buNone/>
+              <a:tabLst/>
+              <a:defRPr/>
+            </a:pPr>
+            <a:r>
+              <a:rPr kumimoji="0" lang="en-US" sz="1100" b="0" i="0" u="none" strike="noStrike" kern="1200" cap="none" spc="0" normalizeH="0" baseline="0" noProof="0" dirty="0" smtClean="0">
                 <a:ln>
                   <a:noFill/>
                 </a:ln>
@@ -11240,7 +11200,7 @@
                 <a:ea typeface="+mn-ea"/>
                 <a:cs typeface="+mn-cs"/>
               </a:rPr>
-              <a:t>0,033</a:t>
+              <a:t>0,027</a:t>
             </a:r>
           </a:p>
           <a:p>
@@ -11262,7 +11222,35 @@
               <a:defRPr/>
             </a:pPr>
             <a:r>
-              <a:rPr kumimoji="0" lang="de-DE" sz="1100" b="0" i="0" u="none" strike="noStrike" kern="1200" cap="none" spc="0" normalizeH="0" baseline="0" noProof="0" dirty="0" smtClean="0">
+              <a:rPr lang="en-US" sz="1100" dirty="0" smtClean="0">
+                <a:solidFill>
+                  <a:prstClr val="white"/>
+                </a:solidFill>
+                <a:latin typeface="Mulish Light"/>
+              </a:rPr>
+              <a:t>0,064</a:t>
+            </a:r>
+          </a:p>
+          <a:p>
+            <a:pPr marL="0" marR="0" lvl="0" indent="0" algn="l" defTabSz="914400" rtl="0" eaLnBrk="1" fontAlgn="auto" latinLnBrk="0" hangingPunct="1">
+              <a:lnSpc>
+                <a:spcPct val="100000"/>
+              </a:lnSpc>
+              <a:spcBef>
+                <a:spcPts val="0"/>
+              </a:spcBef>
+              <a:spcAft>
+                <a:spcPts val="0"/>
+              </a:spcAft>
+              <a:buClrTx/>
+              <a:buSzTx/>
+              <a:buFontTx/>
+              <a:buNone/>
+              <a:tabLst/>
+              <a:defRPr/>
+            </a:pPr>
+            <a:r>
+              <a:rPr kumimoji="0" lang="en-US" sz="1100" b="0" i="0" u="none" strike="noStrike" kern="1200" cap="none" spc="0" normalizeH="0" baseline="0" noProof="0" dirty="0" smtClean="0">
                 <a:ln>
                   <a:noFill/>
                 </a:ln>
@@ -11276,7 +11264,7 @@
                 <a:ea typeface="+mn-ea"/>
                 <a:cs typeface="+mn-cs"/>
               </a:rPr>
-              <a:t>0,017</a:t>
+              <a:t>0,027</a:t>
             </a:r>
           </a:p>
           <a:p>
@@ -11298,94 +11286,28 @@
               <a:defRPr/>
             </a:pPr>
             <a:r>
-              <a:rPr kumimoji="0" lang="de-DE" sz="1100" b="0" i="0" u="none" strike="noStrike" kern="1200" cap="none" spc="0" normalizeH="0" baseline="0" noProof="0" dirty="0" smtClean="0">
-                <a:ln>
-                  <a:noFill/>
-                </a:ln>
+              <a:rPr lang="en-US" sz="1100" dirty="0" smtClean="0">
                 <a:solidFill>
                   <a:prstClr val="white"/>
                 </a:solidFill>
-                <a:effectLst/>
-                <a:uLnTx/>
-                <a:uFillTx/>
                 <a:latin typeface="Mulish Light"/>
-                <a:ea typeface="+mn-ea"/>
-                <a:cs typeface="+mn-cs"/>
-              </a:rPr>
-              <a:t>0,039</a:t>
-            </a:r>
-          </a:p>
-          <a:p>
-            <a:pPr marL="0" marR="0" lvl="0" indent="0" algn="l" defTabSz="914400" rtl="0" eaLnBrk="1" fontAlgn="auto" latinLnBrk="0" hangingPunct="1">
-              <a:lnSpc>
-                <a:spcPct val="100000"/>
-              </a:lnSpc>
-              <a:spcBef>
-                <a:spcPts val="0"/>
-              </a:spcBef>
-              <a:spcAft>
-                <a:spcPts val="0"/>
-              </a:spcAft>
-              <a:buClrTx/>
-              <a:buSzTx/>
-              <a:buFontTx/>
-              <a:buNone/>
-              <a:tabLst/>
-              <a:defRPr/>
-            </a:pPr>
-            <a:r>
-              <a:rPr kumimoji="0" lang="en-US" sz="1100" b="0" i="0" u="none" strike="noStrike" kern="1200" cap="none" spc="0" normalizeH="0" baseline="0" noProof="0" dirty="0" smtClean="0">
-                <a:ln>
-                  <a:noFill/>
-                </a:ln>
-                <a:solidFill>
-                  <a:prstClr val="white"/>
-                </a:solidFill>
-                <a:effectLst/>
-                <a:uLnTx/>
-                <a:uFillTx/>
-                <a:latin typeface="Mulish Light"/>
-                <a:ea typeface="+mn-ea"/>
-                <a:cs typeface="+mn-cs"/>
-              </a:rPr>
-              <a:t>0,017</a:t>
-            </a:r>
-          </a:p>
-          <a:p>
-            <a:pPr marL="0" marR="0" lvl="0" indent="0" algn="l" defTabSz="914400" rtl="0" eaLnBrk="1" fontAlgn="auto" latinLnBrk="0" hangingPunct="1">
-              <a:lnSpc>
-                <a:spcPct val="100000"/>
-              </a:lnSpc>
-              <a:spcBef>
-                <a:spcPts val="0"/>
-              </a:spcBef>
-              <a:spcAft>
-                <a:spcPts val="0"/>
-              </a:spcAft>
-              <a:buClrTx/>
-              <a:buSzTx/>
-              <a:buFontTx/>
-              <a:buNone/>
-              <a:tabLst/>
-              <a:defRPr/>
-            </a:pPr>
-            <a:r>
-              <a:rPr kumimoji="0" lang="en-US" sz="1100" b="0" i="0" u="none" strike="noStrike" kern="1200" cap="none" spc="0" normalizeH="0" baseline="0" noProof="0" dirty="0" smtClean="0">
-                <a:ln>
-                  <a:noFill/>
-                </a:ln>
-                <a:solidFill>
-                  <a:prstClr val="white"/>
-                </a:solidFill>
-                <a:effectLst/>
-                <a:uLnTx/>
-                <a:uFillTx/>
-                <a:latin typeface="Mulish Light"/>
-                <a:ea typeface="+mn-ea"/>
-                <a:cs typeface="+mn-cs"/>
-              </a:rPr>
-              <a:t>0,044</a:t>
-            </a:r>
+              </a:rPr>
+              <a:t>0,073</a:t>
+            </a:r>
+            <a:endParaRPr kumimoji="0" lang="en-US" sz="1100" b="0" i="0" u="none" strike="noStrike" kern="1200" cap="none" spc="0" normalizeH="0" baseline="0" noProof="0" dirty="0" smtClean="0">
+              <a:ln>
+                <a:noFill/>
+              </a:ln>
+              <a:solidFill>
+                <a:prstClr val="white"/>
+              </a:solidFill>
+              <a:effectLst/>
+              <a:uLnTx/>
+              <a:uFillTx/>
+              <a:latin typeface="Mulish Light"/>
+              <a:ea typeface="+mn-ea"/>
+              <a:cs typeface="+mn-cs"/>
+            </a:endParaRPr>
           </a:p>
         </p:txBody>
       </p:sp>
@@ -11473,8 +11395,22 @@
                 <a:ea typeface="+mn-ea"/>
                 <a:cs typeface="+mn-cs"/>
               </a:rPr>
-              <a:t>0,050</a:t>
-            </a:r>
+              <a:t>0,065</a:t>
+            </a:r>
+            <a:endParaRPr kumimoji="0" lang="de-DE" sz="1100" b="0" i="0" u="none" strike="noStrike" kern="1200" cap="none" spc="0" normalizeH="0" baseline="0" noProof="0" dirty="0" smtClean="0">
+              <a:ln>
+                <a:noFill/>
+              </a:ln>
+              <a:solidFill>
+                <a:prstClr val="white"/>
+              </a:solidFill>
+              <a:effectLst/>
+              <a:uLnTx/>
+              <a:uFillTx/>
+              <a:latin typeface="Mulish Light"/>
+              <a:ea typeface="+mn-ea"/>
+              <a:cs typeface="+mn-cs"/>
+            </a:endParaRPr>
           </a:p>
           <a:p>
             <a:pPr marL="0" marR="0" lvl="0" indent="0" algn="l" defTabSz="914400" rtl="0" eaLnBrk="1" fontAlgn="auto" latinLnBrk="0" hangingPunct="1">
@@ -11509,7 +11445,7 @@
                 <a:ea typeface="+mn-ea"/>
                 <a:cs typeface="+mn-cs"/>
               </a:rPr>
-              <a:t>0,020</a:t>
+              <a:t>0,026</a:t>
             </a:r>
             <a:endParaRPr kumimoji="0" lang="en-US" sz="1100" b="0" i="0" u="none" strike="noStrike" kern="1200" cap="none" spc="0" normalizeH="0" baseline="0" noProof="0" dirty="0" smtClean="0">
               <a:ln>
@@ -11614,7 +11550,24 @@
                 <a:ea typeface="+mn-ea"/>
                 <a:cs typeface="+mn-cs"/>
               </a:rPr>
-              <a:t>∑ 0,14</a:t>
+              <a:t>∑ </a:t>
+            </a:r>
+            <a:r>
+              <a:rPr kumimoji="0" lang="de-DE" sz="1100" b="0" i="0" u="none" strike="noStrike" kern="1200" cap="none" spc="0" normalizeH="0" baseline="0" noProof="0" dirty="0" smtClean="0">
+                <a:ln>
+                  <a:noFill/>
+                </a:ln>
+                <a:solidFill>
+                  <a:prstClr val="white"/>
+                </a:solidFill>
+                <a:effectLst/>
+                <a:uLnTx/>
+                <a:uFillTx/>
+                <a:latin typeface="Mulish Light"/>
+                <a:ea typeface="+mn-ea"/>
+                <a:cs typeface="+mn-cs"/>
+              </a:rPr>
+              <a:t>0,182</a:t>
             </a:r>
             <a:endParaRPr kumimoji="0" lang="en-US" sz="1100" b="0" i="0" u="none" strike="noStrike" kern="1200" cap="none" spc="0" normalizeH="0" baseline="0" noProof="0" dirty="0" smtClean="0">
               <a:ln>
@@ -11717,7 +11670,7 @@
                 <a:ea typeface="+mn-ea"/>
                 <a:cs typeface="+mn-cs"/>
               </a:rPr>
-              <a:t>∑ 0,21</a:t>
+              <a:t>∑ 0,273</a:t>
             </a:r>
             <a:endParaRPr kumimoji="0" lang="en-US" sz="1100" b="0" i="0" u="none" strike="noStrike" kern="1200" cap="none" spc="0" normalizeH="0" baseline="0" noProof="0" dirty="0" smtClean="0">
               <a:ln>
@@ -11820,7 +11773,24 @@
                 <a:ea typeface="+mn-ea"/>
                 <a:cs typeface="+mn-cs"/>
               </a:rPr>
-              <a:t>∑ 0,07</a:t>
+              <a:t>∑ </a:t>
+            </a:r>
+            <a:r>
+              <a:rPr kumimoji="0" lang="de-DE" sz="1100" b="0" i="0" u="none" strike="noStrike" kern="1200" cap="none" spc="0" normalizeH="0" baseline="0" noProof="0" dirty="0" smtClean="0">
+                <a:ln>
+                  <a:noFill/>
+                </a:ln>
+                <a:solidFill>
+                  <a:prstClr val="white"/>
+                </a:solidFill>
+                <a:effectLst/>
+                <a:uLnTx/>
+                <a:uFillTx/>
+                <a:latin typeface="Mulish Light"/>
+                <a:ea typeface="+mn-ea"/>
+                <a:cs typeface="+mn-cs"/>
+              </a:rPr>
+              <a:t>0,091</a:t>
             </a:r>
             <a:endParaRPr kumimoji="0" lang="en-US" sz="1100" b="0" i="0" u="none" strike="noStrike" kern="1200" cap="none" spc="0" normalizeH="0" baseline="0" noProof="0" dirty="0" smtClean="0">
               <a:ln>
@@ -12139,7 +12109,7 @@
                 <a:ea typeface="+mn-ea"/>
                 <a:cs typeface="+mn-cs"/>
               </a:rPr>
-              <a:t>0,140</a:t>
+              <a:t>0,182</a:t>
             </a:r>
             <a:endParaRPr kumimoji="0" lang="en-US" sz="1100" b="0" i="0" u="none" strike="noStrike" kern="1200" cap="none" spc="0" normalizeH="0" baseline="0" noProof="0" dirty="0" smtClean="0">
               <a:ln>
@@ -12242,7 +12212,24 @@
                 <a:ea typeface="+mn-ea"/>
                 <a:cs typeface="+mn-cs"/>
               </a:rPr>
-              <a:t>∑ 0,14</a:t>
+              <a:t>∑ </a:t>
+            </a:r>
+            <a:r>
+              <a:rPr kumimoji="0" lang="de-DE" sz="1100" b="0" i="0" u="none" strike="noStrike" kern="1200" cap="none" spc="0" normalizeH="0" baseline="0" noProof="0" dirty="0" smtClean="0">
+                <a:ln>
+                  <a:noFill/>
+                </a:ln>
+                <a:solidFill>
+                  <a:prstClr val="white"/>
+                </a:solidFill>
+                <a:effectLst/>
+                <a:uLnTx/>
+                <a:uFillTx/>
+                <a:latin typeface="Mulish Light"/>
+                <a:ea typeface="+mn-ea"/>
+                <a:cs typeface="+mn-cs"/>
+              </a:rPr>
+              <a:t>0,182</a:t>
             </a:r>
             <a:endParaRPr kumimoji="0" lang="en-US" sz="1100" b="0" i="0" u="none" strike="noStrike" kern="1200" cap="none" spc="0" normalizeH="0" baseline="0" noProof="0" dirty="0" smtClean="0">
               <a:ln>
@@ -12345,8 +12332,22 @@
                 <a:ea typeface="+mn-ea"/>
                 <a:cs typeface="+mn-cs"/>
               </a:rPr>
-              <a:t>0,016</a:t>
-            </a:r>
+              <a:t>0,021</a:t>
+            </a:r>
+            <a:endParaRPr kumimoji="0" lang="de-DE" sz="1100" b="0" i="0" u="none" strike="noStrike" kern="1200" cap="none" spc="0" normalizeH="0" baseline="0" noProof="0" dirty="0" smtClean="0">
+              <a:ln>
+                <a:noFill/>
+              </a:ln>
+              <a:solidFill>
+                <a:prstClr val="white"/>
+              </a:solidFill>
+              <a:effectLst/>
+              <a:uLnTx/>
+              <a:uFillTx/>
+              <a:latin typeface="Mulish Light"/>
+              <a:ea typeface="+mn-ea"/>
+              <a:cs typeface="+mn-cs"/>
+            </a:endParaRPr>
           </a:p>
           <a:p>
             <a:pPr marL="0" marR="0" lvl="0" indent="0" algn="l" defTabSz="914400" rtl="0" eaLnBrk="1" fontAlgn="auto" latinLnBrk="0" hangingPunct="1">
@@ -12367,7 +12368,7 @@
               <a:defRPr/>
             </a:pPr>
             <a:r>
-              <a:rPr kumimoji="0" lang="de-DE" sz="1100" b="0" i="0" u="none" strike="noStrike" kern="1200" cap="none" spc="0" normalizeH="0" baseline="0" noProof="0" dirty="0">
+              <a:rPr kumimoji="0" lang="de-DE" sz="1100" b="0" i="0" u="none" strike="noStrike" kern="1200" cap="none" spc="0" normalizeH="0" baseline="0" noProof="0" dirty="0" smtClean="0">
                 <a:ln>
                   <a:noFill/>
                 </a:ln>
@@ -12381,25 +12382,22 @@
                 <a:ea typeface="+mn-ea"/>
                 <a:cs typeface="+mn-cs"/>
               </a:rPr>
-              <a:t>0,023 0,023 </a:t>
-            </a:r>
-            <a:r>
-              <a:rPr kumimoji="0" lang="de-DE" sz="1100" b="0" i="0" u="none" strike="noStrike" kern="1200" cap="none" spc="0" normalizeH="0" baseline="0" noProof="0" dirty="0" smtClean="0">
-                <a:ln>
-                  <a:noFill/>
-                </a:ln>
-                <a:solidFill>
-                  <a:prstClr val="white"/>
-                </a:solidFill>
-                <a:effectLst/>
-                <a:uLnTx/>
-                <a:uFillTx/>
-                <a:latin typeface="Mulish Light"/>
-                <a:ea typeface="+mn-ea"/>
-                <a:cs typeface="+mn-cs"/>
-              </a:rPr>
-              <a:t>0,007</a:t>
-            </a:r>
+              <a:t>0,030 0,030 0,009</a:t>
+            </a:r>
+            <a:endParaRPr kumimoji="0" lang="de-DE" sz="1100" b="0" i="0" u="none" strike="noStrike" kern="1200" cap="none" spc="0" normalizeH="0" baseline="0" noProof="0" dirty="0" smtClean="0">
+              <a:ln>
+                <a:noFill/>
+              </a:ln>
+              <a:solidFill>
+                <a:prstClr val="white"/>
+              </a:solidFill>
+              <a:effectLst/>
+              <a:uLnTx/>
+              <a:uFillTx/>
+              <a:latin typeface="Mulish Light"/>
+              <a:ea typeface="+mn-ea"/>
+              <a:cs typeface="+mn-cs"/>
+            </a:endParaRPr>
           </a:p>
         </p:txBody>
       </p:sp>
@@ -12487,7 +12485,24 @@
                 <a:ea typeface="+mn-ea"/>
                 <a:cs typeface="+mn-cs"/>
               </a:rPr>
-              <a:t>∑ 0,07</a:t>
+              <a:t>∑ </a:t>
+            </a:r>
+            <a:r>
+              <a:rPr kumimoji="0" lang="de-DE" sz="1100" b="0" i="0" u="none" strike="noStrike" kern="1200" cap="none" spc="0" normalizeH="0" baseline="0" noProof="0" dirty="0" smtClean="0">
+                <a:ln>
+                  <a:noFill/>
+                </a:ln>
+                <a:solidFill>
+                  <a:prstClr val="white"/>
+                </a:solidFill>
+                <a:effectLst/>
+                <a:uLnTx/>
+                <a:uFillTx/>
+                <a:latin typeface="Mulish Light"/>
+                <a:ea typeface="+mn-ea"/>
+                <a:cs typeface="+mn-cs"/>
+              </a:rPr>
+              <a:t>0,091</a:t>
             </a:r>
             <a:endParaRPr kumimoji="0" lang="en-US" sz="1100" b="0" i="0" u="none" strike="noStrike" kern="1200" cap="none" spc="0" normalizeH="0" baseline="0" noProof="0" dirty="0" smtClean="0">
               <a:ln>
@@ -13110,7 +13125,7 @@
               <a:defRPr/>
             </a:pPr>
             <a:r>
-              <a:rPr kumimoji="0" lang="de-DE" sz="1100" b="0" i="0" u="none" strike="noStrike" kern="1200" cap="none" spc="0" normalizeH="0" baseline="0" noProof="0" dirty="0">
+              <a:rPr kumimoji="0" lang="de-DE" sz="1100" b="0" i="0" u="none" strike="noStrike" kern="1200" cap="none" spc="0" normalizeH="0" baseline="0" noProof="0" dirty="0" smtClean="0">
                 <a:ln>
                   <a:noFill/>
                 </a:ln>
@@ -13124,7 +13139,7 @@
                 <a:ea typeface="+mn-ea"/>
                 <a:cs typeface="+mn-cs"/>
               </a:rPr>
-              <a:t>0,047</a:t>
+              <a:t>0,061</a:t>
             </a:r>
           </a:p>
           <a:p>
@@ -13160,7 +13175,7 @@
                 <a:ea typeface="+mn-ea"/>
                 <a:cs typeface="+mn-cs"/>
               </a:rPr>
-              <a:t>0,047</a:t>
+              <a:t>0,061</a:t>
             </a:r>
             <a:endParaRPr kumimoji="0" lang="de-DE" sz="1100" b="0" i="0" u="none" strike="noStrike" kern="1200" cap="none" spc="0" normalizeH="0" baseline="0" noProof="0" dirty="0">
               <a:ln>
@@ -13210,7 +13225,7 @@
                 <a:ea typeface="+mn-ea"/>
                 <a:cs typeface="+mn-cs"/>
               </a:rPr>
-              <a:t>0,047</a:t>
+              <a:t>0,061</a:t>
             </a:r>
             <a:endParaRPr kumimoji="0" lang="en-US" sz="1100" b="0" i="0" u="none" strike="noStrike" kern="1200" cap="none" spc="0" normalizeH="0" baseline="0" noProof="0" dirty="0">
               <a:ln>
@@ -13313,7 +13328,24 @@
                 <a:ea typeface="+mn-ea"/>
                 <a:cs typeface="+mn-cs"/>
               </a:rPr>
-              <a:t>∑ 0,14</a:t>
+              <a:t>∑ </a:t>
+            </a:r>
+            <a:r>
+              <a:rPr kumimoji="0" lang="de-DE" sz="1100" b="0" i="0" u="none" strike="noStrike" kern="1200" cap="none" spc="0" normalizeH="0" baseline="0" noProof="0" dirty="0" smtClean="0">
+                <a:ln>
+                  <a:noFill/>
+                </a:ln>
+                <a:solidFill>
+                  <a:prstClr val="white"/>
+                </a:solidFill>
+                <a:effectLst/>
+                <a:uLnTx/>
+                <a:uFillTx/>
+                <a:latin typeface="Mulish Light"/>
+                <a:ea typeface="+mn-ea"/>
+                <a:cs typeface="+mn-cs"/>
+              </a:rPr>
+              <a:t>0,182</a:t>
             </a:r>
             <a:endParaRPr kumimoji="0" lang="en-US" sz="1100" b="0" i="0" u="none" strike="noStrike" kern="1200" cap="none" spc="0" normalizeH="0" baseline="0" noProof="0" dirty="0" smtClean="0">
               <a:ln>
@@ -15221,214 +15253,6 @@
       </p:sp>
       <p:sp>
         <p:nvSpPr>
-          <p:cNvPr id="16" name="Rechteck 15">
-            <a:extLst>
-              <a:ext uri="{FF2B5EF4-FFF2-40B4-BE49-F238E27FC236}">
-                <a16:creationId xmlns:a16="http://schemas.microsoft.com/office/drawing/2014/main" id="{A0036FF7-A0A3-43F2-B836-5A8A67D584BA}"/>
-              </a:ext>
-            </a:extLst>
-          </p:cNvPr>
-          <p:cNvSpPr/>
-          <p:nvPr/>
-        </p:nvSpPr>
-        <p:spPr>
-          <a:xfrm>
-            <a:off x="6965041" y="1731943"/>
-            <a:ext cx="597127" cy="830319"/>
-          </a:xfrm>
-          <a:prstGeom prst="rect">
-            <a:avLst/>
-          </a:prstGeom>
-          <a:solidFill>
-            <a:schemeClr val="accent1">
-              <a:lumMod val="75000"/>
-            </a:schemeClr>
-          </a:solidFill>
-          <a:ln>
-            <a:noFill/>
-          </a:ln>
-        </p:spPr>
-        <p:style>
-          <a:lnRef idx="2">
-            <a:schemeClr val="accent1">
-              <a:shade val="50000"/>
-            </a:schemeClr>
-          </a:lnRef>
-          <a:fillRef idx="1">
-            <a:schemeClr val="accent1"/>
-          </a:fillRef>
-          <a:effectRef idx="0">
-            <a:schemeClr val="accent1"/>
-          </a:effectRef>
-          <a:fontRef idx="minor">
-            <a:schemeClr val="lt1"/>
-          </a:fontRef>
-        </p:style>
-        <p:txBody>
-          <a:bodyPr rot="0" spcFirstLastPara="0" vertOverflow="overflow" horzOverflow="overflow" vert="horz" wrap="square" lIns="91440" tIns="45720" rIns="91440" bIns="45720" numCol="1" spcCol="0" rtlCol="0" fromWordArt="0" anchor="ctr" anchorCtr="0" forceAA="0" compatLnSpc="1">
-            <a:prstTxWarp prst="textNoShape">
-              <a:avLst/>
-            </a:prstTxWarp>
-            <a:noAutofit/>
-          </a:bodyPr>
-          <a:lstStyle/>
-          <a:p>
-            <a:pPr marL="0" marR="0" lvl="0" indent="0" algn="l" defTabSz="914400" rtl="0" eaLnBrk="1" fontAlgn="auto" latinLnBrk="0" hangingPunct="1">
-              <a:lnSpc>
-                <a:spcPct val="100000"/>
-              </a:lnSpc>
-              <a:spcBef>
-                <a:spcPts val="0"/>
-              </a:spcBef>
-              <a:spcAft>
-                <a:spcPts val="0"/>
-              </a:spcAft>
-              <a:buClrTx/>
-              <a:buSzTx/>
-              <a:buFontTx/>
-              <a:buNone/>
-              <a:tabLst/>
-              <a:defRPr/>
-            </a:pPr>
-            <a:r>
-              <a:rPr kumimoji="0" lang="de-DE" sz="1100" b="0" i="0" u="none" strike="noStrike" kern="1200" cap="none" spc="0" normalizeH="0" baseline="0" noProof="0" dirty="0">
-                <a:ln>
-                  <a:noFill/>
-                </a:ln>
-                <a:solidFill>
-                  <a:prstClr val="white"/>
-                </a:solidFill>
-                <a:effectLst/>
-                <a:uLnTx/>
-                <a:uFillTx/>
-                <a:latin typeface="Mulish Light"/>
-                <a:ea typeface="+mn-ea"/>
-                <a:cs typeface="+mn-cs"/>
-              </a:rPr>
-              <a:t>0,056</a:t>
-            </a:r>
-            <a:r>
-              <a:rPr kumimoji="0" lang="de-DE" sz="1100" b="0" i="0" u="none" strike="noStrike" kern="1200" cap="none" spc="0" normalizeH="0" baseline="0" noProof="0" dirty="0" smtClean="0">
-                <a:ln>
-                  <a:noFill/>
-                </a:ln>
-                <a:solidFill>
-                  <a:prstClr val="white"/>
-                </a:solidFill>
-                <a:effectLst/>
-                <a:uLnTx/>
-                <a:uFillTx/>
-                <a:latin typeface="Mulish Light"/>
-                <a:ea typeface="+mn-ea"/>
-                <a:cs typeface="+mn-cs"/>
-              </a:rPr>
-              <a:t>0,028</a:t>
-            </a:r>
-            <a:endParaRPr kumimoji="0" lang="de-DE" sz="1100" b="0" i="0" u="none" strike="noStrike" kern="1200" cap="none" spc="0" normalizeH="0" baseline="0" noProof="0" dirty="0">
-              <a:ln>
-                <a:noFill/>
-              </a:ln>
-              <a:solidFill>
-                <a:prstClr val="white"/>
-              </a:solidFill>
-              <a:effectLst/>
-              <a:uLnTx/>
-              <a:uFillTx/>
-              <a:latin typeface="Mulish Light"/>
-              <a:ea typeface="+mn-ea"/>
-              <a:cs typeface="+mn-cs"/>
-            </a:endParaRPr>
-          </a:p>
-          <a:p>
-            <a:pPr marL="0" marR="0" lvl="0" indent="0" algn="l" defTabSz="914400" rtl="0" eaLnBrk="1" fontAlgn="auto" latinLnBrk="0" hangingPunct="1">
-              <a:lnSpc>
-                <a:spcPct val="100000"/>
-              </a:lnSpc>
-              <a:spcBef>
-                <a:spcPts val="0"/>
-              </a:spcBef>
-              <a:spcAft>
-                <a:spcPts val="0"/>
-              </a:spcAft>
-              <a:buClrTx/>
-              <a:buSzTx/>
-              <a:buFontTx/>
-              <a:buNone/>
-              <a:tabLst/>
-              <a:defRPr/>
-            </a:pPr>
-            <a:r>
-              <a:rPr kumimoji="0" lang="de-DE" sz="1100" b="0" i="0" u="none" strike="noStrike" kern="1200" cap="none" spc="0" normalizeH="0" baseline="0" noProof="0" dirty="0" smtClean="0">
-                <a:ln>
-                  <a:noFill/>
-                </a:ln>
-                <a:solidFill>
-                  <a:prstClr val="white"/>
-                </a:solidFill>
-                <a:effectLst/>
-                <a:uLnTx/>
-                <a:uFillTx/>
-                <a:latin typeface="Mulish Light"/>
-                <a:ea typeface="+mn-ea"/>
-                <a:cs typeface="+mn-cs"/>
-              </a:rPr>
-              <a:t>0,028</a:t>
-            </a:r>
-          </a:p>
-          <a:p>
-            <a:pPr marL="0" marR="0" lvl="0" indent="0" algn="l" defTabSz="914400" rtl="0" eaLnBrk="1" fontAlgn="auto" latinLnBrk="0" hangingPunct="1">
-              <a:lnSpc>
-                <a:spcPct val="100000"/>
-              </a:lnSpc>
-              <a:spcBef>
-                <a:spcPts val="0"/>
-              </a:spcBef>
-              <a:spcAft>
-                <a:spcPts val="0"/>
-              </a:spcAft>
-              <a:buClrTx/>
-              <a:buSzTx/>
-              <a:buFontTx/>
-              <a:buNone/>
-              <a:tabLst/>
-              <a:defRPr/>
-            </a:pPr>
-            <a:r>
-              <a:rPr kumimoji="0" lang="de-DE" sz="1100" b="0" i="0" u="none" strike="noStrike" kern="1200" cap="none" spc="0" normalizeH="0" baseline="0" noProof="0" dirty="0" smtClean="0">
-                <a:ln>
-                  <a:noFill/>
-                </a:ln>
-                <a:solidFill>
-                  <a:prstClr val="white"/>
-                </a:solidFill>
-                <a:effectLst/>
-                <a:uLnTx/>
-                <a:uFillTx/>
-                <a:latin typeface="Mulish Light"/>
-                <a:ea typeface="+mn-ea"/>
-                <a:cs typeface="+mn-cs"/>
-              </a:rPr>
-              <a:t>0,028</a:t>
-            </a:r>
-            <a:endParaRPr kumimoji="0" lang="de-DE" sz="1100" b="0" i="0" u="none" strike="noStrike" kern="1200" cap="none" spc="0" normalizeH="0" baseline="0" noProof="0" dirty="0">
-              <a:ln>
-                <a:noFill/>
-              </a:ln>
-              <a:solidFill>
-                <a:prstClr val="white"/>
-              </a:solidFill>
-              <a:effectLst/>
-              <a:uLnTx/>
-              <a:uFillTx/>
-              <a:latin typeface="Mulish Light"/>
-              <a:ea typeface="+mn-ea"/>
-              <a:cs typeface="+mn-cs"/>
-            </a:endParaRPr>
-          </a:p>
-        </p:txBody>
-      </p:sp>
-      <p:sp>
-        <p:nvSpPr>
           <p:cNvPr id="17" name="Rechteck 16">
             <a:extLst>
               <a:ext uri="{FF2B5EF4-FFF2-40B4-BE49-F238E27FC236}">
@@ -15786,725 +15610,6 @@
       </p:sp>
       <p:sp>
         <p:nvSpPr>
-          <p:cNvPr id="20" name="Rechteck 19">
-            <a:extLst>
-              <a:ext uri="{FF2B5EF4-FFF2-40B4-BE49-F238E27FC236}">
-                <a16:creationId xmlns:a16="http://schemas.microsoft.com/office/drawing/2014/main" id="{A0036FF7-A0A3-43F2-B836-5A8A67D584BA}"/>
-              </a:ext>
-            </a:extLst>
-          </p:cNvPr>
-          <p:cNvSpPr/>
-          <p:nvPr/>
-        </p:nvSpPr>
-        <p:spPr>
-          <a:xfrm>
-            <a:off x="6965037" y="2635827"/>
-            <a:ext cx="597132" cy="1096203"/>
-          </a:xfrm>
-          <a:prstGeom prst="rect">
-            <a:avLst/>
-          </a:prstGeom>
-          <a:solidFill>
-            <a:srgbClr val="800000"/>
-          </a:solidFill>
-          <a:ln>
-            <a:noFill/>
-          </a:ln>
-        </p:spPr>
-        <p:style>
-          <a:lnRef idx="2">
-            <a:schemeClr val="accent1">
-              <a:shade val="50000"/>
-            </a:schemeClr>
-          </a:lnRef>
-          <a:fillRef idx="1">
-            <a:schemeClr val="accent1"/>
-          </a:fillRef>
-          <a:effectRef idx="0">
-            <a:schemeClr val="accent1"/>
-          </a:effectRef>
-          <a:fontRef idx="minor">
-            <a:schemeClr val="lt1"/>
-          </a:fontRef>
-        </p:style>
-        <p:txBody>
-          <a:bodyPr rot="0" spcFirstLastPara="0" vertOverflow="overflow" horzOverflow="overflow" vert="horz" wrap="square" lIns="91440" tIns="45720" rIns="91440" bIns="45720" numCol="1" spcCol="0" rtlCol="0" fromWordArt="0" anchor="ctr" anchorCtr="0" forceAA="0" compatLnSpc="1">
-            <a:prstTxWarp prst="textNoShape">
-              <a:avLst/>
-            </a:prstTxWarp>
-            <a:noAutofit/>
-          </a:bodyPr>
-          <a:lstStyle/>
-          <a:p>
-            <a:pPr marL="0" marR="0" lvl="0" indent="0" algn="l" defTabSz="914400" rtl="0" eaLnBrk="1" fontAlgn="auto" latinLnBrk="0" hangingPunct="1">
-              <a:lnSpc>
-                <a:spcPct val="100000"/>
-              </a:lnSpc>
-              <a:spcBef>
-                <a:spcPts val="0"/>
-              </a:spcBef>
-              <a:spcAft>
-                <a:spcPts val="0"/>
-              </a:spcAft>
-              <a:buClrTx/>
-              <a:buSzTx/>
-              <a:buFontTx/>
-              <a:buNone/>
-              <a:tabLst/>
-              <a:defRPr/>
-            </a:pPr>
-            <a:r>
-              <a:rPr kumimoji="0" lang="de-DE" sz="1100" b="0" i="0" u="none" strike="noStrike" kern="1200" cap="none" spc="0" normalizeH="0" baseline="0" noProof="0" dirty="0" smtClean="0">
-                <a:ln>
-                  <a:noFill/>
-                </a:ln>
-                <a:solidFill>
-                  <a:prstClr val="white"/>
-                </a:solidFill>
-                <a:effectLst/>
-                <a:uLnTx/>
-                <a:uFillTx/>
-                <a:latin typeface="Mulish Light"/>
-                <a:ea typeface="+mn-ea"/>
-                <a:cs typeface="+mn-cs"/>
-              </a:rPr>
-              <a:t>0,017</a:t>
-            </a:r>
-          </a:p>
-          <a:p>
-            <a:pPr marL="0" marR="0" lvl="0" indent="0" algn="l" defTabSz="914400" rtl="0" eaLnBrk="1" fontAlgn="auto" latinLnBrk="0" hangingPunct="1">
-              <a:lnSpc>
-                <a:spcPct val="100000"/>
-              </a:lnSpc>
-              <a:spcBef>
-                <a:spcPts val="0"/>
-              </a:spcBef>
-              <a:spcAft>
-                <a:spcPts val="0"/>
-              </a:spcAft>
-              <a:buClrTx/>
-              <a:buSzTx/>
-              <a:buFontTx/>
-              <a:buNone/>
-              <a:tabLst/>
-              <a:defRPr/>
-            </a:pPr>
-            <a:r>
-              <a:rPr kumimoji="0" lang="de-DE" sz="1100" b="0" i="0" u="none" strike="noStrike" kern="1200" cap="none" spc="0" normalizeH="0" baseline="0" noProof="0" dirty="0" smtClean="0">
-                <a:ln>
-                  <a:noFill/>
-                </a:ln>
-                <a:solidFill>
-                  <a:prstClr val="white"/>
-                </a:solidFill>
-                <a:effectLst/>
-                <a:uLnTx/>
-                <a:uFillTx/>
-                <a:latin typeface="Mulish Light"/>
-                <a:ea typeface="+mn-ea"/>
-                <a:cs typeface="+mn-cs"/>
-              </a:rPr>
-              <a:t>0,033</a:t>
-            </a:r>
-          </a:p>
-          <a:p>
-            <a:pPr marL="0" marR="0" lvl="0" indent="0" algn="l" defTabSz="914400" rtl="0" eaLnBrk="1" fontAlgn="auto" latinLnBrk="0" hangingPunct="1">
-              <a:lnSpc>
-                <a:spcPct val="100000"/>
-              </a:lnSpc>
-              <a:spcBef>
-                <a:spcPts val="0"/>
-              </a:spcBef>
-              <a:spcAft>
-                <a:spcPts val="0"/>
-              </a:spcAft>
-              <a:buClrTx/>
-              <a:buSzTx/>
-              <a:buFontTx/>
-              <a:buNone/>
-              <a:tabLst/>
-              <a:defRPr/>
-            </a:pPr>
-            <a:r>
-              <a:rPr kumimoji="0" lang="de-DE" sz="1100" b="0" i="0" u="none" strike="noStrike" kern="1200" cap="none" spc="0" normalizeH="0" baseline="0" noProof="0" dirty="0" smtClean="0">
-                <a:ln>
-                  <a:noFill/>
-                </a:ln>
-                <a:solidFill>
-                  <a:prstClr val="white"/>
-                </a:solidFill>
-                <a:effectLst/>
-                <a:uLnTx/>
-                <a:uFillTx/>
-                <a:latin typeface="Mulish Light"/>
-                <a:ea typeface="+mn-ea"/>
-                <a:cs typeface="+mn-cs"/>
-              </a:rPr>
-              <a:t>0,017</a:t>
-            </a:r>
-          </a:p>
-          <a:p>
-            <a:pPr marL="0" marR="0" lvl="0" indent="0" algn="l" defTabSz="914400" rtl="0" eaLnBrk="1" fontAlgn="auto" latinLnBrk="0" hangingPunct="1">
-              <a:lnSpc>
-                <a:spcPct val="100000"/>
-              </a:lnSpc>
-              <a:spcBef>
-                <a:spcPts val="0"/>
-              </a:spcBef>
-              <a:spcAft>
-                <a:spcPts val="0"/>
-              </a:spcAft>
-              <a:buClrTx/>
-              <a:buSzTx/>
-              <a:buFontTx/>
-              <a:buNone/>
-              <a:tabLst/>
-              <a:defRPr/>
-            </a:pPr>
-            <a:r>
-              <a:rPr kumimoji="0" lang="de-DE" sz="1100" b="0" i="0" u="none" strike="noStrike" kern="1200" cap="none" spc="0" normalizeH="0" baseline="0" noProof="0" dirty="0" smtClean="0">
-                <a:ln>
-                  <a:noFill/>
-                </a:ln>
-                <a:solidFill>
-                  <a:prstClr val="white"/>
-                </a:solidFill>
-                <a:effectLst/>
-                <a:uLnTx/>
-                <a:uFillTx/>
-                <a:latin typeface="Mulish Light"/>
-                <a:ea typeface="+mn-ea"/>
-                <a:cs typeface="+mn-cs"/>
-              </a:rPr>
-              <a:t>0,039</a:t>
-            </a:r>
-          </a:p>
-          <a:p>
-            <a:pPr marL="0" marR="0" lvl="0" indent="0" algn="l" defTabSz="914400" rtl="0" eaLnBrk="1" fontAlgn="auto" latinLnBrk="0" hangingPunct="1">
-              <a:lnSpc>
-                <a:spcPct val="100000"/>
-              </a:lnSpc>
-              <a:spcBef>
-                <a:spcPts val="0"/>
-              </a:spcBef>
-              <a:spcAft>
-                <a:spcPts val="0"/>
-              </a:spcAft>
-              <a:buClrTx/>
-              <a:buSzTx/>
-              <a:buFontTx/>
-              <a:buNone/>
-              <a:tabLst/>
-              <a:defRPr/>
-            </a:pPr>
-            <a:r>
-              <a:rPr kumimoji="0" lang="en-US" sz="1100" b="0" i="0" u="none" strike="noStrike" kern="1200" cap="none" spc="0" normalizeH="0" baseline="0" noProof="0" dirty="0" smtClean="0">
-                <a:ln>
-                  <a:noFill/>
-                </a:ln>
-                <a:solidFill>
-                  <a:prstClr val="white"/>
-                </a:solidFill>
-                <a:effectLst/>
-                <a:uLnTx/>
-                <a:uFillTx/>
-                <a:latin typeface="Mulish Light"/>
-                <a:ea typeface="+mn-ea"/>
-                <a:cs typeface="+mn-cs"/>
-              </a:rPr>
-              <a:t>0,017</a:t>
-            </a:r>
-          </a:p>
-          <a:p>
-            <a:pPr marL="0" marR="0" lvl="0" indent="0" algn="l" defTabSz="914400" rtl="0" eaLnBrk="1" fontAlgn="auto" latinLnBrk="0" hangingPunct="1">
-              <a:lnSpc>
-                <a:spcPct val="100000"/>
-              </a:lnSpc>
-              <a:spcBef>
-                <a:spcPts val="0"/>
-              </a:spcBef>
-              <a:spcAft>
-                <a:spcPts val="0"/>
-              </a:spcAft>
-              <a:buClrTx/>
-              <a:buSzTx/>
-              <a:buFontTx/>
-              <a:buNone/>
-              <a:tabLst/>
-              <a:defRPr/>
-            </a:pPr>
-            <a:r>
-              <a:rPr kumimoji="0" lang="en-US" sz="1100" b="0" i="0" u="none" strike="noStrike" kern="1200" cap="none" spc="0" normalizeH="0" baseline="0" noProof="0" dirty="0" smtClean="0">
-                <a:ln>
-                  <a:noFill/>
-                </a:ln>
-                <a:solidFill>
-                  <a:prstClr val="white"/>
-                </a:solidFill>
-                <a:effectLst/>
-                <a:uLnTx/>
-                <a:uFillTx/>
-                <a:latin typeface="Mulish Light"/>
-                <a:ea typeface="+mn-ea"/>
-                <a:cs typeface="+mn-cs"/>
-              </a:rPr>
-              <a:t>0,044</a:t>
-            </a:r>
-          </a:p>
-        </p:txBody>
-      </p:sp>
-      <p:sp>
-        <p:nvSpPr>
-          <p:cNvPr id="21" name="Rechteck 20">
-            <a:extLst>
-              <a:ext uri="{FF2B5EF4-FFF2-40B4-BE49-F238E27FC236}">
-                <a16:creationId xmlns:a16="http://schemas.microsoft.com/office/drawing/2014/main" id="{A0036FF7-A0A3-43F2-B836-5A8A67D584BA}"/>
-              </a:ext>
-            </a:extLst>
-          </p:cNvPr>
-          <p:cNvSpPr/>
-          <p:nvPr/>
-        </p:nvSpPr>
-        <p:spPr>
-          <a:xfrm>
-            <a:off x="6965037" y="3814877"/>
-            <a:ext cx="597131" cy="514781"/>
-          </a:xfrm>
-          <a:prstGeom prst="rect">
-            <a:avLst/>
-          </a:prstGeom>
-          <a:solidFill>
-            <a:srgbClr val="E6BA00"/>
-          </a:solidFill>
-          <a:ln>
-            <a:noFill/>
-          </a:ln>
-        </p:spPr>
-        <p:style>
-          <a:lnRef idx="2">
-            <a:schemeClr val="accent1">
-              <a:shade val="50000"/>
-            </a:schemeClr>
-          </a:lnRef>
-          <a:fillRef idx="1">
-            <a:schemeClr val="accent1"/>
-          </a:fillRef>
-          <a:effectRef idx="0">
-            <a:schemeClr val="accent1"/>
-          </a:effectRef>
-          <a:fontRef idx="minor">
-            <a:schemeClr val="lt1"/>
-          </a:fontRef>
-        </p:style>
-        <p:txBody>
-          <a:bodyPr rot="0" spcFirstLastPara="0" vertOverflow="overflow" horzOverflow="overflow" vert="horz" wrap="square" lIns="91440" tIns="45720" rIns="91440" bIns="45720" numCol="1" spcCol="0" rtlCol="0" fromWordArt="0" anchor="ctr" anchorCtr="0" forceAA="0" compatLnSpc="1">
-            <a:prstTxWarp prst="textNoShape">
-              <a:avLst/>
-            </a:prstTxWarp>
-            <a:noAutofit/>
-          </a:bodyPr>
-          <a:lstStyle/>
-          <a:p>
-            <a:pPr marL="0" marR="0" lvl="0" indent="0" algn="l" defTabSz="914400" rtl="0" eaLnBrk="1" fontAlgn="auto" latinLnBrk="0" hangingPunct="1">
-              <a:lnSpc>
-                <a:spcPct val="100000"/>
-              </a:lnSpc>
-              <a:spcBef>
-                <a:spcPts val="0"/>
-              </a:spcBef>
-              <a:spcAft>
-                <a:spcPts val="0"/>
-              </a:spcAft>
-              <a:buClrTx/>
-              <a:buSzTx/>
-              <a:buFontTx/>
-              <a:buNone/>
-              <a:tabLst/>
-              <a:defRPr/>
-            </a:pPr>
-            <a:r>
-              <a:rPr kumimoji="0" lang="de-DE" sz="1100" b="0" i="0" u="none" strike="noStrike" kern="1200" cap="none" spc="0" normalizeH="0" baseline="0" noProof="0" dirty="0" smtClean="0">
-                <a:ln>
-                  <a:noFill/>
-                </a:ln>
-                <a:solidFill>
-                  <a:prstClr val="white"/>
-                </a:solidFill>
-                <a:effectLst/>
-                <a:uLnTx/>
-                <a:uFillTx/>
-                <a:latin typeface="Mulish Light"/>
-                <a:ea typeface="+mn-ea"/>
-                <a:cs typeface="+mn-cs"/>
-              </a:rPr>
-              <a:t>0,050</a:t>
-            </a:r>
-          </a:p>
-          <a:p>
-            <a:pPr marL="0" marR="0" lvl="0" indent="0" algn="l" defTabSz="914400" rtl="0" eaLnBrk="1" fontAlgn="auto" latinLnBrk="0" hangingPunct="1">
-              <a:lnSpc>
-                <a:spcPct val="100000"/>
-              </a:lnSpc>
-              <a:spcBef>
-                <a:spcPts val="0"/>
-              </a:spcBef>
-              <a:spcAft>
-                <a:spcPts val="0"/>
-              </a:spcAft>
-              <a:buClrTx/>
-              <a:buSzTx/>
-              <a:buFontTx/>
-              <a:buNone/>
-              <a:tabLst/>
-              <a:defRPr/>
-            </a:pPr>
-            <a:r>
-              <a:rPr kumimoji="0" lang="de-DE" sz="1100" b="0" i="0" u="none" strike="noStrike" kern="1200" cap="none" spc="0" normalizeH="0" baseline="0" noProof="0" dirty="0" smtClean="0">
-                <a:ln>
-                  <a:noFill/>
-                </a:ln>
-                <a:solidFill>
-                  <a:prstClr val="white"/>
-                </a:solidFill>
-                <a:effectLst/>
-                <a:uLnTx/>
-                <a:uFillTx/>
-                <a:latin typeface="Mulish Light"/>
-                <a:ea typeface="+mn-ea"/>
-                <a:cs typeface="+mn-cs"/>
-              </a:rPr>
-              <a:t>0,020</a:t>
-            </a:r>
-            <a:endParaRPr kumimoji="0" lang="en-US" sz="1100" b="0" i="0" u="none" strike="noStrike" kern="1200" cap="none" spc="0" normalizeH="0" baseline="0" noProof="0" dirty="0" smtClean="0">
-              <a:ln>
-                <a:noFill/>
-              </a:ln>
-              <a:solidFill>
-                <a:prstClr val="white"/>
-              </a:solidFill>
-              <a:effectLst/>
-              <a:uLnTx/>
-              <a:uFillTx/>
-              <a:latin typeface="Mulish Light"/>
-              <a:ea typeface="+mn-ea"/>
-              <a:cs typeface="+mn-cs"/>
-            </a:endParaRPr>
-          </a:p>
-        </p:txBody>
-      </p:sp>
-      <p:sp>
-        <p:nvSpPr>
-          <p:cNvPr id="22" name="Rechteck 21">
-            <a:extLst>
-              <a:ext uri="{FF2B5EF4-FFF2-40B4-BE49-F238E27FC236}">
-                <a16:creationId xmlns:a16="http://schemas.microsoft.com/office/drawing/2014/main" id="{A0036FF7-A0A3-43F2-B836-5A8A67D584BA}"/>
-              </a:ext>
-            </a:extLst>
-          </p:cNvPr>
-          <p:cNvSpPr/>
-          <p:nvPr/>
-        </p:nvSpPr>
-        <p:spPr>
-          <a:xfrm>
-            <a:off x="7644268" y="1731943"/>
-            <a:ext cx="723114" cy="830319"/>
-          </a:xfrm>
-          <a:prstGeom prst="rect">
-            <a:avLst/>
-          </a:prstGeom>
-          <a:solidFill>
-            <a:schemeClr val="accent1">
-              <a:lumMod val="75000"/>
-            </a:schemeClr>
-          </a:solidFill>
-          <a:ln>
-            <a:noFill/>
-          </a:ln>
-        </p:spPr>
-        <p:style>
-          <a:lnRef idx="2">
-            <a:schemeClr val="accent1">
-              <a:shade val="50000"/>
-            </a:schemeClr>
-          </a:lnRef>
-          <a:fillRef idx="1">
-            <a:schemeClr val="accent1"/>
-          </a:fillRef>
-          <a:effectRef idx="0">
-            <a:schemeClr val="accent1"/>
-          </a:effectRef>
-          <a:fontRef idx="minor">
-            <a:schemeClr val="lt1"/>
-          </a:fontRef>
-        </p:style>
-        <p:txBody>
-          <a:bodyPr rot="0" spcFirstLastPara="0" vertOverflow="overflow" horzOverflow="overflow" vert="horz" wrap="square" lIns="91440" tIns="45720" rIns="91440" bIns="45720" numCol="1" spcCol="0" rtlCol="0" fromWordArt="0" anchor="ctr" anchorCtr="0" forceAA="0" compatLnSpc="1">
-            <a:prstTxWarp prst="textNoShape">
-              <a:avLst/>
-            </a:prstTxWarp>
-            <a:noAutofit/>
-          </a:bodyPr>
-          <a:lstStyle/>
-          <a:p>
-            <a:pPr marL="0" marR="0" lvl="0" indent="0" algn="l" defTabSz="914400" rtl="0" eaLnBrk="1" fontAlgn="auto" latinLnBrk="0" hangingPunct="1">
-              <a:lnSpc>
-                <a:spcPct val="100000"/>
-              </a:lnSpc>
-              <a:spcBef>
-                <a:spcPts val="0"/>
-              </a:spcBef>
-              <a:spcAft>
-                <a:spcPts val="0"/>
-              </a:spcAft>
-              <a:buClrTx/>
-              <a:buSzTx/>
-              <a:buFontTx/>
-              <a:buNone/>
-              <a:tabLst/>
-              <a:defRPr/>
-            </a:pPr>
-            <a:r>
-              <a:rPr kumimoji="0" lang="de-DE" sz="1100" b="0" i="0" u="none" strike="noStrike" kern="1200" cap="none" spc="0" normalizeH="0" baseline="0" noProof="0" dirty="0" smtClean="0">
-                <a:ln>
-                  <a:noFill/>
-                </a:ln>
-                <a:solidFill>
-                  <a:prstClr val="white"/>
-                </a:solidFill>
-                <a:effectLst/>
-                <a:uLnTx/>
-                <a:uFillTx/>
-                <a:latin typeface="Mulish Light"/>
-                <a:ea typeface="+mn-ea"/>
-                <a:cs typeface="+mn-cs"/>
-              </a:rPr>
-              <a:t>∑ 0,14</a:t>
-            </a:r>
-            <a:endParaRPr kumimoji="0" lang="en-US" sz="1100" b="0" i="0" u="none" strike="noStrike" kern="1200" cap="none" spc="0" normalizeH="0" baseline="0" noProof="0" dirty="0" smtClean="0">
-              <a:ln>
-                <a:noFill/>
-              </a:ln>
-              <a:solidFill>
-                <a:prstClr val="white"/>
-              </a:solidFill>
-              <a:effectLst/>
-              <a:uLnTx/>
-              <a:uFillTx/>
-              <a:latin typeface="Mulish Light"/>
-              <a:ea typeface="+mn-ea"/>
-              <a:cs typeface="+mn-cs"/>
-            </a:endParaRPr>
-          </a:p>
-        </p:txBody>
-      </p:sp>
-      <p:sp>
-        <p:nvSpPr>
-          <p:cNvPr id="23" name="Rechteck 22">
-            <a:extLst>
-              <a:ext uri="{FF2B5EF4-FFF2-40B4-BE49-F238E27FC236}">
-                <a16:creationId xmlns:a16="http://schemas.microsoft.com/office/drawing/2014/main" id="{A0036FF7-A0A3-43F2-B836-5A8A67D584BA}"/>
-              </a:ext>
-            </a:extLst>
-          </p:cNvPr>
-          <p:cNvSpPr/>
-          <p:nvPr/>
-        </p:nvSpPr>
-        <p:spPr>
-          <a:xfrm>
-            <a:off x="7644268" y="2635826"/>
-            <a:ext cx="723114" cy="1096204"/>
-          </a:xfrm>
-          <a:prstGeom prst="rect">
-            <a:avLst/>
-          </a:prstGeom>
-          <a:solidFill>
-            <a:srgbClr val="800000"/>
-          </a:solidFill>
-          <a:ln>
-            <a:noFill/>
-          </a:ln>
-        </p:spPr>
-        <p:style>
-          <a:lnRef idx="2">
-            <a:schemeClr val="accent1">
-              <a:shade val="50000"/>
-            </a:schemeClr>
-          </a:lnRef>
-          <a:fillRef idx="1">
-            <a:schemeClr val="accent1"/>
-          </a:fillRef>
-          <a:effectRef idx="0">
-            <a:schemeClr val="accent1"/>
-          </a:effectRef>
-          <a:fontRef idx="minor">
-            <a:schemeClr val="lt1"/>
-          </a:fontRef>
-        </p:style>
-        <p:txBody>
-          <a:bodyPr rot="0" spcFirstLastPara="0" vertOverflow="overflow" horzOverflow="overflow" vert="horz" wrap="square" lIns="91440" tIns="45720" rIns="91440" bIns="45720" numCol="1" spcCol="0" rtlCol="0" fromWordArt="0" anchor="ctr" anchorCtr="0" forceAA="0" compatLnSpc="1">
-            <a:prstTxWarp prst="textNoShape">
-              <a:avLst/>
-            </a:prstTxWarp>
-            <a:noAutofit/>
-          </a:bodyPr>
-          <a:lstStyle/>
-          <a:p>
-            <a:pPr marL="0" marR="0" lvl="0" indent="0" algn="l" defTabSz="914400" rtl="0" eaLnBrk="1" fontAlgn="auto" latinLnBrk="0" hangingPunct="1">
-              <a:lnSpc>
-                <a:spcPct val="100000"/>
-              </a:lnSpc>
-              <a:spcBef>
-                <a:spcPts val="0"/>
-              </a:spcBef>
-              <a:spcAft>
-                <a:spcPts val="0"/>
-              </a:spcAft>
-              <a:buClrTx/>
-              <a:buSzTx/>
-              <a:buFontTx/>
-              <a:buNone/>
-              <a:tabLst/>
-              <a:defRPr/>
-            </a:pPr>
-            <a:r>
-              <a:rPr kumimoji="0" lang="de-DE" sz="1100" b="0" i="0" u="none" strike="noStrike" kern="1200" cap="none" spc="0" normalizeH="0" baseline="0" noProof="0" dirty="0" smtClean="0">
-                <a:ln>
-                  <a:noFill/>
-                </a:ln>
-                <a:solidFill>
-                  <a:prstClr val="white"/>
-                </a:solidFill>
-                <a:effectLst/>
-                <a:uLnTx/>
-                <a:uFillTx/>
-                <a:latin typeface="Mulish Light"/>
-                <a:ea typeface="+mn-ea"/>
-                <a:cs typeface="+mn-cs"/>
-              </a:rPr>
-              <a:t>∑ 0,21</a:t>
-            </a:r>
-            <a:endParaRPr kumimoji="0" lang="en-US" sz="1100" b="0" i="0" u="none" strike="noStrike" kern="1200" cap="none" spc="0" normalizeH="0" baseline="0" noProof="0" dirty="0" smtClean="0">
-              <a:ln>
-                <a:noFill/>
-              </a:ln>
-              <a:solidFill>
-                <a:prstClr val="white"/>
-              </a:solidFill>
-              <a:effectLst/>
-              <a:uLnTx/>
-              <a:uFillTx/>
-              <a:latin typeface="Mulish Light"/>
-              <a:ea typeface="+mn-ea"/>
-              <a:cs typeface="+mn-cs"/>
-            </a:endParaRPr>
-          </a:p>
-        </p:txBody>
-      </p:sp>
-      <p:sp>
-        <p:nvSpPr>
-          <p:cNvPr id="24" name="Rechteck 23">
-            <a:extLst>
-              <a:ext uri="{FF2B5EF4-FFF2-40B4-BE49-F238E27FC236}">
-                <a16:creationId xmlns:a16="http://schemas.microsoft.com/office/drawing/2014/main" id="{A0036FF7-A0A3-43F2-B836-5A8A67D584BA}"/>
-              </a:ext>
-            </a:extLst>
-          </p:cNvPr>
-          <p:cNvSpPr/>
-          <p:nvPr/>
-        </p:nvSpPr>
-        <p:spPr>
-          <a:xfrm>
-            <a:off x="7644268" y="3814875"/>
-            <a:ext cx="723114" cy="514783"/>
-          </a:xfrm>
-          <a:prstGeom prst="rect">
-            <a:avLst/>
-          </a:prstGeom>
-          <a:solidFill>
-            <a:srgbClr val="E6BA00"/>
-          </a:solidFill>
-          <a:ln>
-            <a:noFill/>
-          </a:ln>
-        </p:spPr>
-        <p:style>
-          <a:lnRef idx="2">
-            <a:schemeClr val="accent1">
-              <a:shade val="50000"/>
-            </a:schemeClr>
-          </a:lnRef>
-          <a:fillRef idx="1">
-            <a:schemeClr val="accent1"/>
-          </a:fillRef>
-          <a:effectRef idx="0">
-            <a:schemeClr val="accent1"/>
-          </a:effectRef>
-          <a:fontRef idx="minor">
-            <a:schemeClr val="lt1"/>
-          </a:fontRef>
-        </p:style>
-        <p:txBody>
-          <a:bodyPr rot="0" spcFirstLastPara="0" vertOverflow="overflow" horzOverflow="overflow" vert="horz" wrap="square" lIns="91440" tIns="45720" rIns="91440" bIns="45720" numCol="1" spcCol="0" rtlCol="0" fromWordArt="0" anchor="ctr" anchorCtr="0" forceAA="0" compatLnSpc="1">
-            <a:prstTxWarp prst="textNoShape">
-              <a:avLst/>
-            </a:prstTxWarp>
-            <a:noAutofit/>
-          </a:bodyPr>
-          <a:lstStyle/>
-          <a:p>
-            <a:pPr marL="0" marR="0" lvl="0" indent="0" algn="l" defTabSz="914400" rtl="0" eaLnBrk="1" fontAlgn="auto" latinLnBrk="0" hangingPunct="1">
-              <a:lnSpc>
-                <a:spcPct val="100000"/>
-              </a:lnSpc>
-              <a:spcBef>
-                <a:spcPts val="0"/>
-              </a:spcBef>
-              <a:spcAft>
-                <a:spcPts val="0"/>
-              </a:spcAft>
-              <a:buClrTx/>
-              <a:buSzTx/>
-              <a:buFontTx/>
-              <a:buNone/>
-              <a:tabLst/>
-              <a:defRPr/>
-            </a:pPr>
-            <a:r>
-              <a:rPr kumimoji="0" lang="de-DE" sz="1100" b="0" i="0" u="none" strike="noStrike" kern="1200" cap="none" spc="0" normalizeH="0" baseline="0" noProof="0" dirty="0" smtClean="0">
-                <a:ln>
-                  <a:noFill/>
-                </a:ln>
-                <a:solidFill>
-                  <a:prstClr val="white"/>
-                </a:solidFill>
-                <a:effectLst/>
-                <a:uLnTx/>
-                <a:uFillTx/>
-                <a:latin typeface="Mulish Light"/>
-                <a:ea typeface="+mn-ea"/>
-                <a:cs typeface="+mn-cs"/>
-              </a:rPr>
-              <a:t>∑ 0,07</a:t>
-            </a:r>
-            <a:endParaRPr kumimoji="0" lang="en-US" sz="1100" b="0" i="0" u="none" strike="noStrike" kern="1200" cap="none" spc="0" normalizeH="0" baseline="0" noProof="0" dirty="0" smtClean="0">
-              <a:ln>
-                <a:noFill/>
-              </a:ln>
-              <a:solidFill>
-                <a:prstClr val="white"/>
-              </a:solidFill>
-              <a:effectLst/>
-              <a:uLnTx/>
-              <a:uFillTx/>
-              <a:latin typeface="Mulish Light"/>
-              <a:ea typeface="+mn-ea"/>
-              <a:cs typeface="+mn-cs"/>
-            </a:endParaRPr>
-          </a:p>
-        </p:txBody>
-      </p:sp>
-      <p:sp>
-        <p:nvSpPr>
           <p:cNvPr id="25" name="Rechteck 24">
             <a:extLst>
               <a:ext uri="{FF2B5EF4-FFF2-40B4-BE49-F238E27FC236}">
@@ -16734,457 +15839,6 @@
               </a:rPr>
               <a:t>Water fountains</a:t>
             </a:r>
-          </a:p>
-        </p:txBody>
-      </p:sp>
-      <p:sp>
-        <p:nvSpPr>
-          <p:cNvPr id="26" name="Rechteck 25">
-            <a:extLst>
-              <a:ext uri="{FF2B5EF4-FFF2-40B4-BE49-F238E27FC236}">
-                <a16:creationId xmlns:a16="http://schemas.microsoft.com/office/drawing/2014/main" id="{A0036FF7-A0A3-43F2-B836-5A8A67D584BA}"/>
-              </a:ext>
-            </a:extLst>
-          </p:cNvPr>
-          <p:cNvSpPr/>
-          <p:nvPr/>
-        </p:nvSpPr>
-        <p:spPr>
-          <a:xfrm>
-            <a:off x="6965037" y="5025514"/>
-            <a:ext cx="597131" cy="551246"/>
-          </a:xfrm>
-          <a:prstGeom prst="rect">
-            <a:avLst/>
-          </a:prstGeom>
-          <a:solidFill>
-            <a:srgbClr val="4472C4"/>
-          </a:solidFill>
-          <a:ln>
-            <a:noFill/>
-          </a:ln>
-        </p:spPr>
-        <p:style>
-          <a:lnRef idx="2">
-            <a:schemeClr val="accent1">
-              <a:shade val="50000"/>
-            </a:schemeClr>
-          </a:lnRef>
-          <a:fillRef idx="1">
-            <a:schemeClr val="accent1"/>
-          </a:fillRef>
-          <a:effectRef idx="0">
-            <a:schemeClr val="accent1"/>
-          </a:effectRef>
-          <a:fontRef idx="minor">
-            <a:schemeClr val="lt1"/>
-          </a:fontRef>
-        </p:style>
-        <p:txBody>
-          <a:bodyPr rot="0" spcFirstLastPara="0" vertOverflow="overflow" horzOverflow="overflow" vert="horz" wrap="square" lIns="91440" tIns="45720" rIns="91440" bIns="45720" numCol="1" spcCol="0" rtlCol="0" fromWordArt="0" anchor="ctr" anchorCtr="0" forceAA="0" compatLnSpc="1">
-            <a:prstTxWarp prst="textNoShape">
-              <a:avLst/>
-            </a:prstTxWarp>
-            <a:noAutofit/>
-          </a:bodyPr>
-          <a:lstStyle/>
-          <a:p>
-            <a:pPr marL="0" marR="0" lvl="0" indent="0" algn="l" defTabSz="914400" rtl="0" eaLnBrk="1" fontAlgn="auto" latinLnBrk="0" hangingPunct="1">
-              <a:lnSpc>
-                <a:spcPct val="100000"/>
-              </a:lnSpc>
-              <a:spcBef>
-                <a:spcPts val="0"/>
-              </a:spcBef>
-              <a:spcAft>
-                <a:spcPts val="0"/>
-              </a:spcAft>
-              <a:buClrTx/>
-              <a:buSzTx/>
-              <a:buFontTx/>
-              <a:buNone/>
-              <a:tabLst/>
-              <a:defRPr/>
-            </a:pPr>
-            <a:r>
-              <a:rPr kumimoji="0" lang="de-DE" sz="1100" b="0" i="0" u="none" strike="noStrike" kern="1200" cap="none" spc="0" normalizeH="0" baseline="0" noProof="0" dirty="0" smtClean="0">
-                <a:ln>
-                  <a:noFill/>
-                </a:ln>
-                <a:solidFill>
-                  <a:prstClr val="white"/>
-                </a:solidFill>
-                <a:effectLst/>
-                <a:uLnTx/>
-                <a:uFillTx/>
-                <a:latin typeface="Mulish Light"/>
-                <a:ea typeface="+mn-ea"/>
-                <a:cs typeface="+mn-cs"/>
-              </a:rPr>
-              <a:t>0,140</a:t>
-            </a:r>
-            <a:endParaRPr kumimoji="0" lang="en-US" sz="1100" b="0" i="0" u="none" strike="noStrike" kern="1200" cap="none" spc="0" normalizeH="0" baseline="0" noProof="0" dirty="0" smtClean="0">
-              <a:ln>
-                <a:noFill/>
-              </a:ln>
-              <a:solidFill>
-                <a:prstClr val="white"/>
-              </a:solidFill>
-              <a:effectLst/>
-              <a:uLnTx/>
-              <a:uFillTx/>
-              <a:latin typeface="Mulish Light"/>
-              <a:ea typeface="+mn-ea"/>
-              <a:cs typeface="+mn-cs"/>
-            </a:endParaRPr>
-          </a:p>
-        </p:txBody>
-      </p:sp>
-      <p:sp>
-        <p:nvSpPr>
-          <p:cNvPr id="27" name="Rechteck 26">
-            <a:extLst>
-              <a:ext uri="{FF2B5EF4-FFF2-40B4-BE49-F238E27FC236}">
-                <a16:creationId xmlns:a16="http://schemas.microsoft.com/office/drawing/2014/main" id="{A0036FF7-A0A3-43F2-B836-5A8A67D584BA}"/>
-              </a:ext>
-            </a:extLst>
-          </p:cNvPr>
-          <p:cNvSpPr/>
-          <p:nvPr/>
-        </p:nvSpPr>
-        <p:spPr>
-          <a:xfrm>
-            <a:off x="7644268" y="5025512"/>
-            <a:ext cx="723114" cy="551248"/>
-          </a:xfrm>
-          <a:prstGeom prst="rect">
-            <a:avLst/>
-          </a:prstGeom>
-          <a:solidFill>
-            <a:schemeClr val="accent6"/>
-          </a:solidFill>
-          <a:ln>
-            <a:noFill/>
-          </a:ln>
-        </p:spPr>
-        <p:style>
-          <a:lnRef idx="2">
-            <a:schemeClr val="accent1">
-              <a:shade val="50000"/>
-            </a:schemeClr>
-          </a:lnRef>
-          <a:fillRef idx="1">
-            <a:schemeClr val="accent1"/>
-          </a:fillRef>
-          <a:effectRef idx="0">
-            <a:schemeClr val="accent1"/>
-          </a:effectRef>
-          <a:fontRef idx="minor">
-            <a:schemeClr val="lt1"/>
-          </a:fontRef>
-        </p:style>
-        <p:txBody>
-          <a:bodyPr rot="0" spcFirstLastPara="0" vertOverflow="overflow" horzOverflow="overflow" vert="horz" wrap="square" lIns="91440" tIns="45720" rIns="91440" bIns="45720" numCol="1" spcCol="0" rtlCol="0" fromWordArt="0" anchor="ctr" anchorCtr="0" forceAA="0" compatLnSpc="1">
-            <a:prstTxWarp prst="textNoShape">
-              <a:avLst/>
-            </a:prstTxWarp>
-            <a:noAutofit/>
-          </a:bodyPr>
-          <a:lstStyle/>
-          <a:p>
-            <a:pPr marL="0" marR="0" lvl="0" indent="0" algn="l" defTabSz="914400" rtl="0" eaLnBrk="1" fontAlgn="auto" latinLnBrk="0" hangingPunct="1">
-              <a:lnSpc>
-                <a:spcPct val="100000"/>
-              </a:lnSpc>
-              <a:spcBef>
-                <a:spcPts val="0"/>
-              </a:spcBef>
-              <a:spcAft>
-                <a:spcPts val="0"/>
-              </a:spcAft>
-              <a:buClrTx/>
-              <a:buSzTx/>
-              <a:buFontTx/>
-              <a:buNone/>
-              <a:tabLst/>
-              <a:defRPr/>
-            </a:pPr>
-            <a:r>
-              <a:rPr kumimoji="0" lang="de-DE" sz="1100" b="0" i="0" u="none" strike="noStrike" kern="1200" cap="none" spc="0" normalizeH="0" baseline="0" noProof="0" dirty="0" smtClean="0">
-                <a:ln>
-                  <a:noFill/>
-                </a:ln>
-                <a:solidFill>
-                  <a:prstClr val="white"/>
-                </a:solidFill>
-                <a:effectLst/>
-                <a:uLnTx/>
-                <a:uFillTx/>
-                <a:latin typeface="Mulish Light"/>
-                <a:ea typeface="+mn-ea"/>
-                <a:cs typeface="+mn-cs"/>
-              </a:rPr>
-              <a:t>∑ 0,14</a:t>
-            </a:r>
-            <a:endParaRPr kumimoji="0" lang="en-US" sz="1100" b="0" i="0" u="none" strike="noStrike" kern="1200" cap="none" spc="0" normalizeH="0" baseline="0" noProof="0" dirty="0" smtClean="0">
-              <a:ln>
-                <a:noFill/>
-              </a:ln>
-              <a:solidFill>
-                <a:prstClr val="white"/>
-              </a:solidFill>
-              <a:effectLst/>
-              <a:uLnTx/>
-              <a:uFillTx/>
-              <a:latin typeface="Mulish Light"/>
-              <a:ea typeface="+mn-ea"/>
-              <a:cs typeface="+mn-cs"/>
-            </a:endParaRPr>
-          </a:p>
-        </p:txBody>
-      </p:sp>
-      <p:sp>
-        <p:nvSpPr>
-          <p:cNvPr id="28" name="Rechteck 27">
-            <a:extLst>
-              <a:ext uri="{FF2B5EF4-FFF2-40B4-BE49-F238E27FC236}">
-                <a16:creationId xmlns:a16="http://schemas.microsoft.com/office/drawing/2014/main" id="{A0036FF7-A0A3-43F2-B836-5A8A67D584BA}"/>
-              </a:ext>
-            </a:extLst>
-          </p:cNvPr>
-          <p:cNvSpPr/>
-          <p:nvPr/>
-        </p:nvSpPr>
-        <p:spPr>
-          <a:xfrm>
-            <a:off x="6965037" y="5635669"/>
-            <a:ext cx="597131" cy="772626"/>
-          </a:xfrm>
-          <a:prstGeom prst="rect">
-            <a:avLst/>
-          </a:prstGeom>
-          <a:solidFill>
-            <a:srgbClr val="6A1371"/>
-          </a:solidFill>
-          <a:ln>
-            <a:noFill/>
-          </a:ln>
-        </p:spPr>
-        <p:style>
-          <a:lnRef idx="2">
-            <a:schemeClr val="accent1">
-              <a:shade val="50000"/>
-            </a:schemeClr>
-          </a:lnRef>
-          <a:fillRef idx="1">
-            <a:schemeClr val="accent1"/>
-          </a:fillRef>
-          <a:effectRef idx="0">
-            <a:schemeClr val="accent1"/>
-          </a:effectRef>
-          <a:fontRef idx="minor">
-            <a:schemeClr val="lt1"/>
-          </a:fontRef>
-        </p:style>
-        <p:txBody>
-          <a:bodyPr rot="0" spcFirstLastPara="0" vertOverflow="overflow" horzOverflow="overflow" vert="horz" wrap="square" lIns="91440" tIns="45720" rIns="91440" bIns="45720" numCol="1" spcCol="0" rtlCol="0" fromWordArt="0" anchor="ctr" anchorCtr="0" forceAA="0" compatLnSpc="1">
-            <a:prstTxWarp prst="textNoShape">
-              <a:avLst/>
-            </a:prstTxWarp>
-            <a:noAutofit/>
-          </a:bodyPr>
-          <a:lstStyle/>
-          <a:p>
-            <a:pPr marL="0" marR="0" lvl="0" indent="0" algn="l" defTabSz="914400" rtl="0" eaLnBrk="1" fontAlgn="auto" latinLnBrk="0" hangingPunct="1">
-              <a:lnSpc>
-                <a:spcPct val="100000"/>
-              </a:lnSpc>
-              <a:spcBef>
-                <a:spcPts val="0"/>
-              </a:spcBef>
-              <a:spcAft>
-                <a:spcPts val="0"/>
-              </a:spcAft>
-              <a:buClrTx/>
-              <a:buSzTx/>
-              <a:buFontTx/>
-              <a:buNone/>
-              <a:tabLst/>
-              <a:defRPr/>
-            </a:pPr>
-            <a:r>
-              <a:rPr kumimoji="0" lang="de-DE" sz="1100" b="0" i="0" u="none" strike="noStrike" kern="1200" cap="none" spc="0" normalizeH="0" baseline="0" noProof="0" dirty="0" smtClean="0">
-                <a:ln>
-                  <a:noFill/>
-                </a:ln>
-                <a:solidFill>
-                  <a:prstClr val="white"/>
-                </a:solidFill>
-                <a:effectLst/>
-                <a:uLnTx/>
-                <a:uFillTx/>
-                <a:latin typeface="Mulish Light"/>
-                <a:ea typeface="+mn-ea"/>
-                <a:cs typeface="+mn-cs"/>
-              </a:rPr>
-              <a:t>0,016</a:t>
-            </a:r>
-          </a:p>
-          <a:p>
-            <a:pPr marL="0" marR="0" lvl="0" indent="0" algn="l" defTabSz="914400" rtl="0" eaLnBrk="1" fontAlgn="auto" latinLnBrk="0" hangingPunct="1">
-              <a:lnSpc>
-                <a:spcPct val="100000"/>
-              </a:lnSpc>
-              <a:spcBef>
-                <a:spcPts val="0"/>
-              </a:spcBef>
-              <a:spcAft>
-                <a:spcPts val="0"/>
-              </a:spcAft>
-              <a:buClrTx/>
-              <a:buSzTx/>
-              <a:buFontTx/>
-              <a:buNone/>
-              <a:tabLst/>
-              <a:defRPr/>
-            </a:pPr>
-            <a:r>
-              <a:rPr kumimoji="0" lang="de-DE" sz="1100" b="0" i="0" u="none" strike="noStrike" kern="1200" cap="none" spc="0" normalizeH="0" baseline="0" noProof="0" dirty="0">
-                <a:ln>
-                  <a:noFill/>
-                </a:ln>
-                <a:solidFill>
-                  <a:prstClr val="white"/>
-                </a:solidFill>
-                <a:effectLst/>
-                <a:uLnTx/>
-                <a:uFillTx/>
-                <a:latin typeface="Mulish Light"/>
-                <a:ea typeface="+mn-ea"/>
-                <a:cs typeface="+mn-cs"/>
-              </a:rPr>
-              <a:t>0,023 0,023 </a:t>
-            </a:r>
-            <a:r>
-              <a:rPr kumimoji="0" lang="de-DE" sz="1100" b="0" i="0" u="none" strike="noStrike" kern="1200" cap="none" spc="0" normalizeH="0" baseline="0" noProof="0" dirty="0" smtClean="0">
-                <a:ln>
-                  <a:noFill/>
-                </a:ln>
-                <a:solidFill>
-                  <a:prstClr val="white"/>
-                </a:solidFill>
-                <a:effectLst/>
-                <a:uLnTx/>
-                <a:uFillTx/>
-                <a:latin typeface="Mulish Light"/>
-                <a:ea typeface="+mn-ea"/>
-                <a:cs typeface="+mn-cs"/>
-              </a:rPr>
-              <a:t>0,007</a:t>
-            </a:r>
-          </a:p>
-        </p:txBody>
-      </p:sp>
-      <p:sp>
-        <p:nvSpPr>
-          <p:cNvPr id="29" name="Rechteck 28">
-            <a:extLst>
-              <a:ext uri="{FF2B5EF4-FFF2-40B4-BE49-F238E27FC236}">
-                <a16:creationId xmlns:a16="http://schemas.microsoft.com/office/drawing/2014/main" id="{A0036FF7-A0A3-43F2-B836-5A8A67D584BA}"/>
-              </a:ext>
-            </a:extLst>
-          </p:cNvPr>
-          <p:cNvSpPr/>
-          <p:nvPr/>
-        </p:nvSpPr>
-        <p:spPr>
-          <a:xfrm>
-            <a:off x="7644268" y="5635669"/>
-            <a:ext cx="723114" cy="772626"/>
-          </a:xfrm>
-          <a:prstGeom prst="rect">
-            <a:avLst/>
-          </a:prstGeom>
-          <a:solidFill>
-            <a:srgbClr val="6A1371"/>
-          </a:solidFill>
-          <a:ln>
-            <a:noFill/>
-          </a:ln>
-        </p:spPr>
-        <p:style>
-          <a:lnRef idx="2">
-            <a:schemeClr val="accent1">
-              <a:shade val="50000"/>
-            </a:schemeClr>
-          </a:lnRef>
-          <a:fillRef idx="1">
-            <a:schemeClr val="accent1"/>
-          </a:fillRef>
-          <a:effectRef idx="0">
-            <a:schemeClr val="accent1"/>
-          </a:effectRef>
-          <a:fontRef idx="minor">
-            <a:schemeClr val="lt1"/>
-          </a:fontRef>
-        </p:style>
-        <p:txBody>
-          <a:bodyPr rot="0" spcFirstLastPara="0" vertOverflow="overflow" horzOverflow="overflow" vert="horz" wrap="square" lIns="91440" tIns="45720" rIns="91440" bIns="45720" numCol="1" spcCol="0" rtlCol="0" fromWordArt="0" anchor="ctr" anchorCtr="0" forceAA="0" compatLnSpc="1">
-            <a:prstTxWarp prst="textNoShape">
-              <a:avLst/>
-            </a:prstTxWarp>
-            <a:noAutofit/>
-          </a:bodyPr>
-          <a:lstStyle/>
-          <a:p>
-            <a:pPr marL="0" marR="0" lvl="0" indent="0" algn="l" defTabSz="914400" rtl="0" eaLnBrk="1" fontAlgn="auto" latinLnBrk="0" hangingPunct="1">
-              <a:lnSpc>
-                <a:spcPct val="100000"/>
-              </a:lnSpc>
-              <a:spcBef>
-                <a:spcPts val="0"/>
-              </a:spcBef>
-              <a:spcAft>
-                <a:spcPts val="0"/>
-              </a:spcAft>
-              <a:buClrTx/>
-              <a:buSzTx/>
-              <a:buFontTx/>
-              <a:buNone/>
-              <a:tabLst/>
-              <a:defRPr/>
-            </a:pPr>
-            <a:r>
-              <a:rPr kumimoji="0" lang="de-DE" sz="1100" b="0" i="0" u="none" strike="noStrike" kern="1200" cap="none" spc="0" normalizeH="0" baseline="0" noProof="0" dirty="0" smtClean="0">
-                <a:ln>
-                  <a:noFill/>
-                </a:ln>
-                <a:solidFill>
-                  <a:prstClr val="white"/>
-                </a:solidFill>
-                <a:effectLst/>
-                <a:uLnTx/>
-                <a:uFillTx/>
-                <a:latin typeface="Mulish Light"/>
-                <a:ea typeface="+mn-ea"/>
-                <a:cs typeface="+mn-cs"/>
-              </a:rPr>
-              <a:t>∑ 0,07</a:t>
-            </a:r>
-            <a:endParaRPr kumimoji="0" lang="en-US" sz="1100" b="0" i="0" u="none" strike="noStrike" kern="1200" cap="none" spc="0" normalizeH="0" baseline="0" noProof="0" dirty="0" smtClean="0">
-              <a:ln>
-                <a:noFill/>
-              </a:ln>
-              <a:solidFill>
-                <a:prstClr val="white"/>
-              </a:solidFill>
-              <a:effectLst/>
-              <a:uLnTx/>
-              <a:uFillTx/>
-              <a:latin typeface="Mulish Light"/>
-              <a:ea typeface="+mn-ea"/>
-              <a:cs typeface="+mn-cs"/>
-            </a:endParaRPr>
           </a:p>
         </p:txBody>
       </p:sp>
@@ -17789,7 +16443,1465 @@
       </p:pic>
       <p:sp>
         <p:nvSpPr>
-          <p:cNvPr id="39" name="Rechteck 38">
+          <p:cNvPr id="41" name="Rechteck 40">
+            <a:extLst>
+              <a:ext uri="{FF2B5EF4-FFF2-40B4-BE49-F238E27FC236}">
+                <a16:creationId xmlns:a16="http://schemas.microsoft.com/office/drawing/2014/main" id="{A0036FF7-A0A3-43F2-B836-5A8A67D584BA}"/>
+              </a:ext>
+            </a:extLst>
+          </p:cNvPr>
+          <p:cNvSpPr/>
+          <p:nvPr/>
+        </p:nvSpPr>
+        <p:spPr>
+          <a:xfrm>
+            <a:off x="6965041" y="1731943"/>
+            <a:ext cx="597127" cy="830319"/>
+          </a:xfrm>
+          <a:prstGeom prst="rect">
+            <a:avLst/>
+          </a:prstGeom>
+          <a:solidFill>
+            <a:schemeClr val="accent1">
+              <a:lumMod val="75000"/>
+            </a:schemeClr>
+          </a:solidFill>
+          <a:ln>
+            <a:noFill/>
+          </a:ln>
+        </p:spPr>
+        <p:style>
+          <a:lnRef idx="2">
+            <a:schemeClr val="accent1">
+              <a:shade val="50000"/>
+            </a:schemeClr>
+          </a:lnRef>
+          <a:fillRef idx="1">
+            <a:schemeClr val="accent1"/>
+          </a:fillRef>
+          <a:effectRef idx="0">
+            <a:schemeClr val="accent1"/>
+          </a:effectRef>
+          <a:fontRef idx="minor">
+            <a:schemeClr val="lt1"/>
+          </a:fontRef>
+        </p:style>
+        <p:txBody>
+          <a:bodyPr rot="0" spcFirstLastPara="0" vertOverflow="overflow" horzOverflow="overflow" vert="horz" wrap="square" lIns="91440" tIns="45720" rIns="91440" bIns="45720" numCol="1" spcCol="0" rtlCol="0" fromWordArt="0" anchor="ctr" anchorCtr="0" forceAA="0" compatLnSpc="1">
+            <a:prstTxWarp prst="textNoShape">
+              <a:avLst/>
+            </a:prstTxWarp>
+            <a:noAutofit/>
+          </a:bodyPr>
+          <a:lstStyle/>
+          <a:p>
+            <a:pPr marL="0" marR="0" lvl="0" indent="0" algn="l" defTabSz="914400" rtl="0" eaLnBrk="1" fontAlgn="auto" latinLnBrk="0" hangingPunct="1">
+              <a:lnSpc>
+                <a:spcPct val="100000"/>
+              </a:lnSpc>
+              <a:spcBef>
+                <a:spcPts val="0"/>
+              </a:spcBef>
+              <a:spcAft>
+                <a:spcPts val="0"/>
+              </a:spcAft>
+              <a:buClrTx/>
+              <a:buSzTx/>
+              <a:buFontTx/>
+              <a:buNone/>
+              <a:tabLst/>
+              <a:defRPr/>
+            </a:pPr>
+            <a:r>
+              <a:rPr kumimoji="0" lang="de-DE" sz="1100" b="0" i="0" u="none" strike="noStrike" kern="1200" cap="none" spc="0" normalizeH="0" baseline="0" noProof="0" dirty="0" smtClean="0">
+                <a:ln>
+                  <a:noFill/>
+                </a:ln>
+                <a:solidFill>
+                  <a:prstClr val="white"/>
+                </a:solidFill>
+                <a:effectLst/>
+                <a:uLnTx/>
+                <a:uFillTx/>
+                <a:latin typeface="Mulish Light"/>
+                <a:ea typeface="+mn-ea"/>
+                <a:cs typeface="+mn-cs"/>
+              </a:rPr>
+              <a:t>0,0730,036</a:t>
+            </a:r>
+            <a:endParaRPr kumimoji="0" lang="de-DE" sz="1100" b="0" i="0" u="none" strike="noStrike" kern="1200" cap="none" spc="0" normalizeH="0" baseline="0" noProof="0" dirty="0">
+              <a:ln>
+                <a:noFill/>
+              </a:ln>
+              <a:solidFill>
+                <a:prstClr val="white"/>
+              </a:solidFill>
+              <a:effectLst/>
+              <a:uLnTx/>
+              <a:uFillTx/>
+              <a:latin typeface="Mulish Light"/>
+              <a:ea typeface="+mn-ea"/>
+              <a:cs typeface="+mn-cs"/>
+            </a:endParaRPr>
+          </a:p>
+          <a:p>
+            <a:pPr marL="0" marR="0" lvl="0" indent="0" algn="l" defTabSz="914400" rtl="0" eaLnBrk="1" fontAlgn="auto" latinLnBrk="0" hangingPunct="1">
+              <a:lnSpc>
+                <a:spcPct val="100000"/>
+              </a:lnSpc>
+              <a:spcBef>
+                <a:spcPts val="0"/>
+              </a:spcBef>
+              <a:spcAft>
+                <a:spcPts val="0"/>
+              </a:spcAft>
+              <a:buClrTx/>
+              <a:buSzTx/>
+              <a:buFontTx/>
+              <a:buNone/>
+              <a:tabLst/>
+              <a:defRPr/>
+            </a:pPr>
+            <a:r>
+              <a:rPr kumimoji="0" lang="de-DE" sz="1100" b="0" i="0" u="none" strike="noStrike" kern="1200" cap="none" spc="0" normalizeH="0" baseline="0" noProof="0" dirty="0" smtClean="0">
+                <a:ln>
+                  <a:noFill/>
+                </a:ln>
+                <a:solidFill>
+                  <a:prstClr val="white"/>
+                </a:solidFill>
+                <a:effectLst/>
+                <a:uLnTx/>
+                <a:uFillTx/>
+                <a:latin typeface="Mulish Light"/>
+                <a:ea typeface="+mn-ea"/>
+                <a:cs typeface="+mn-cs"/>
+              </a:rPr>
+              <a:t>0,036</a:t>
+            </a:r>
+            <a:endParaRPr kumimoji="0" lang="de-DE" sz="1100" b="0" i="0" u="none" strike="noStrike" kern="1200" cap="none" spc="0" normalizeH="0" baseline="0" noProof="0" dirty="0" smtClean="0">
+              <a:ln>
+                <a:noFill/>
+              </a:ln>
+              <a:solidFill>
+                <a:prstClr val="white"/>
+              </a:solidFill>
+              <a:effectLst/>
+              <a:uLnTx/>
+              <a:uFillTx/>
+              <a:latin typeface="Mulish Light"/>
+              <a:ea typeface="+mn-ea"/>
+              <a:cs typeface="+mn-cs"/>
+            </a:endParaRPr>
+          </a:p>
+          <a:p>
+            <a:pPr marL="0" marR="0" lvl="0" indent="0" algn="l" defTabSz="914400" rtl="0" eaLnBrk="1" fontAlgn="auto" latinLnBrk="0" hangingPunct="1">
+              <a:lnSpc>
+                <a:spcPct val="100000"/>
+              </a:lnSpc>
+              <a:spcBef>
+                <a:spcPts val="0"/>
+              </a:spcBef>
+              <a:spcAft>
+                <a:spcPts val="0"/>
+              </a:spcAft>
+              <a:buClrTx/>
+              <a:buSzTx/>
+              <a:buFontTx/>
+              <a:buNone/>
+              <a:tabLst/>
+              <a:defRPr/>
+            </a:pPr>
+            <a:r>
+              <a:rPr kumimoji="0" lang="de-DE" sz="1100" b="0" i="0" u="none" strike="noStrike" kern="1200" cap="none" spc="0" normalizeH="0" baseline="0" noProof="0" dirty="0" smtClean="0">
+                <a:ln>
+                  <a:noFill/>
+                </a:ln>
+                <a:solidFill>
+                  <a:prstClr val="white"/>
+                </a:solidFill>
+                <a:effectLst/>
+                <a:uLnTx/>
+                <a:uFillTx/>
+                <a:latin typeface="Mulish Light"/>
+                <a:ea typeface="+mn-ea"/>
+                <a:cs typeface="+mn-cs"/>
+              </a:rPr>
+              <a:t>0,036</a:t>
+            </a:r>
+            <a:endParaRPr kumimoji="0" lang="de-DE" sz="1100" b="0" i="0" u="none" strike="noStrike" kern="1200" cap="none" spc="0" normalizeH="0" baseline="0" noProof="0" dirty="0">
+              <a:ln>
+                <a:noFill/>
+              </a:ln>
+              <a:solidFill>
+                <a:prstClr val="white"/>
+              </a:solidFill>
+              <a:effectLst/>
+              <a:uLnTx/>
+              <a:uFillTx/>
+              <a:latin typeface="Mulish Light"/>
+              <a:ea typeface="+mn-ea"/>
+              <a:cs typeface="+mn-cs"/>
+            </a:endParaRPr>
+          </a:p>
+        </p:txBody>
+      </p:sp>
+      <p:sp>
+        <p:nvSpPr>
+          <p:cNvPr id="42" name="Rechteck 41">
+            <a:extLst>
+              <a:ext uri="{FF2B5EF4-FFF2-40B4-BE49-F238E27FC236}">
+                <a16:creationId xmlns:a16="http://schemas.microsoft.com/office/drawing/2014/main" id="{A0036FF7-A0A3-43F2-B836-5A8A67D584BA}"/>
+              </a:ext>
+            </a:extLst>
+          </p:cNvPr>
+          <p:cNvSpPr/>
+          <p:nvPr/>
+        </p:nvSpPr>
+        <p:spPr>
+          <a:xfrm>
+            <a:off x="6965037" y="2635827"/>
+            <a:ext cx="597132" cy="1096203"/>
+          </a:xfrm>
+          <a:prstGeom prst="rect">
+            <a:avLst/>
+          </a:prstGeom>
+          <a:solidFill>
+            <a:srgbClr val="800000"/>
+          </a:solidFill>
+          <a:ln>
+            <a:noFill/>
+          </a:ln>
+        </p:spPr>
+        <p:style>
+          <a:lnRef idx="2">
+            <a:schemeClr val="accent1">
+              <a:shade val="50000"/>
+            </a:schemeClr>
+          </a:lnRef>
+          <a:fillRef idx="1">
+            <a:schemeClr val="accent1"/>
+          </a:fillRef>
+          <a:effectRef idx="0">
+            <a:schemeClr val="accent1"/>
+          </a:effectRef>
+          <a:fontRef idx="minor">
+            <a:schemeClr val="lt1"/>
+          </a:fontRef>
+        </p:style>
+        <p:txBody>
+          <a:bodyPr rot="0" spcFirstLastPara="0" vertOverflow="overflow" horzOverflow="overflow" vert="horz" wrap="square" lIns="91440" tIns="45720" rIns="91440" bIns="45720" numCol="1" spcCol="0" rtlCol="0" fromWordArt="0" anchor="ctr" anchorCtr="0" forceAA="0" compatLnSpc="1">
+            <a:prstTxWarp prst="textNoShape">
+              <a:avLst/>
+            </a:prstTxWarp>
+            <a:noAutofit/>
+          </a:bodyPr>
+          <a:lstStyle/>
+          <a:p>
+            <a:pPr marL="0" marR="0" lvl="0" indent="0" algn="l" defTabSz="914400" rtl="0" eaLnBrk="1" fontAlgn="auto" latinLnBrk="0" hangingPunct="1">
+              <a:lnSpc>
+                <a:spcPct val="100000"/>
+              </a:lnSpc>
+              <a:spcBef>
+                <a:spcPts val="0"/>
+              </a:spcBef>
+              <a:spcAft>
+                <a:spcPts val="0"/>
+              </a:spcAft>
+              <a:buClrTx/>
+              <a:buSzTx/>
+              <a:buFontTx/>
+              <a:buNone/>
+              <a:tabLst/>
+              <a:defRPr/>
+            </a:pPr>
+            <a:r>
+              <a:rPr kumimoji="0" lang="en-US" sz="1100" b="0" i="0" u="none" strike="noStrike" kern="1200" cap="none" spc="0" normalizeH="0" baseline="0" noProof="0" dirty="0" smtClean="0">
+                <a:ln>
+                  <a:noFill/>
+                </a:ln>
+                <a:solidFill>
+                  <a:prstClr val="white"/>
+                </a:solidFill>
+                <a:effectLst/>
+                <a:uLnTx/>
+                <a:uFillTx/>
+                <a:latin typeface="Mulish Light"/>
+                <a:ea typeface="+mn-ea"/>
+                <a:cs typeface="+mn-cs"/>
+              </a:rPr>
+              <a:t>0,027</a:t>
+            </a:r>
+          </a:p>
+          <a:p>
+            <a:pPr marL="0" marR="0" lvl="0" indent="0" algn="l" defTabSz="914400" rtl="0" eaLnBrk="1" fontAlgn="auto" latinLnBrk="0" hangingPunct="1">
+              <a:lnSpc>
+                <a:spcPct val="100000"/>
+              </a:lnSpc>
+              <a:spcBef>
+                <a:spcPts val="0"/>
+              </a:spcBef>
+              <a:spcAft>
+                <a:spcPts val="0"/>
+              </a:spcAft>
+              <a:buClrTx/>
+              <a:buSzTx/>
+              <a:buFontTx/>
+              <a:buNone/>
+              <a:tabLst/>
+              <a:defRPr/>
+            </a:pPr>
+            <a:r>
+              <a:rPr lang="en-US" sz="1100" dirty="0" smtClean="0">
+                <a:solidFill>
+                  <a:prstClr val="white"/>
+                </a:solidFill>
+                <a:latin typeface="Mulish Light"/>
+              </a:rPr>
+              <a:t>0,055</a:t>
+            </a:r>
+          </a:p>
+          <a:p>
+            <a:pPr marL="0" marR="0" lvl="0" indent="0" algn="l" defTabSz="914400" rtl="0" eaLnBrk="1" fontAlgn="auto" latinLnBrk="0" hangingPunct="1">
+              <a:lnSpc>
+                <a:spcPct val="100000"/>
+              </a:lnSpc>
+              <a:spcBef>
+                <a:spcPts val="0"/>
+              </a:spcBef>
+              <a:spcAft>
+                <a:spcPts val="0"/>
+              </a:spcAft>
+              <a:buClrTx/>
+              <a:buSzTx/>
+              <a:buFontTx/>
+              <a:buNone/>
+              <a:tabLst/>
+              <a:defRPr/>
+            </a:pPr>
+            <a:r>
+              <a:rPr kumimoji="0" lang="en-US" sz="1100" b="0" i="0" u="none" strike="noStrike" kern="1200" cap="none" spc="0" normalizeH="0" baseline="0" noProof="0" dirty="0" smtClean="0">
+                <a:ln>
+                  <a:noFill/>
+                </a:ln>
+                <a:solidFill>
+                  <a:prstClr val="white"/>
+                </a:solidFill>
+                <a:effectLst/>
+                <a:uLnTx/>
+                <a:uFillTx/>
+                <a:latin typeface="Mulish Light"/>
+                <a:ea typeface="+mn-ea"/>
+                <a:cs typeface="+mn-cs"/>
+              </a:rPr>
+              <a:t>0,027</a:t>
+            </a:r>
+          </a:p>
+          <a:p>
+            <a:pPr marL="0" marR="0" lvl="0" indent="0" algn="l" defTabSz="914400" rtl="0" eaLnBrk="1" fontAlgn="auto" latinLnBrk="0" hangingPunct="1">
+              <a:lnSpc>
+                <a:spcPct val="100000"/>
+              </a:lnSpc>
+              <a:spcBef>
+                <a:spcPts val="0"/>
+              </a:spcBef>
+              <a:spcAft>
+                <a:spcPts val="0"/>
+              </a:spcAft>
+              <a:buClrTx/>
+              <a:buSzTx/>
+              <a:buFontTx/>
+              <a:buNone/>
+              <a:tabLst/>
+              <a:defRPr/>
+            </a:pPr>
+            <a:r>
+              <a:rPr lang="en-US" sz="1100" dirty="0" smtClean="0">
+                <a:solidFill>
+                  <a:prstClr val="white"/>
+                </a:solidFill>
+                <a:latin typeface="Mulish Light"/>
+              </a:rPr>
+              <a:t>0,064</a:t>
+            </a:r>
+          </a:p>
+          <a:p>
+            <a:pPr marL="0" marR="0" lvl="0" indent="0" algn="l" defTabSz="914400" rtl="0" eaLnBrk="1" fontAlgn="auto" latinLnBrk="0" hangingPunct="1">
+              <a:lnSpc>
+                <a:spcPct val="100000"/>
+              </a:lnSpc>
+              <a:spcBef>
+                <a:spcPts val="0"/>
+              </a:spcBef>
+              <a:spcAft>
+                <a:spcPts val="0"/>
+              </a:spcAft>
+              <a:buClrTx/>
+              <a:buSzTx/>
+              <a:buFontTx/>
+              <a:buNone/>
+              <a:tabLst/>
+              <a:defRPr/>
+            </a:pPr>
+            <a:r>
+              <a:rPr kumimoji="0" lang="en-US" sz="1100" b="0" i="0" u="none" strike="noStrike" kern="1200" cap="none" spc="0" normalizeH="0" baseline="0" noProof="0" dirty="0" smtClean="0">
+                <a:ln>
+                  <a:noFill/>
+                </a:ln>
+                <a:solidFill>
+                  <a:prstClr val="white"/>
+                </a:solidFill>
+                <a:effectLst/>
+                <a:uLnTx/>
+                <a:uFillTx/>
+                <a:latin typeface="Mulish Light"/>
+                <a:ea typeface="+mn-ea"/>
+                <a:cs typeface="+mn-cs"/>
+              </a:rPr>
+              <a:t>0,027</a:t>
+            </a:r>
+          </a:p>
+          <a:p>
+            <a:pPr marL="0" marR="0" lvl="0" indent="0" algn="l" defTabSz="914400" rtl="0" eaLnBrk="1" fontAlgn="auto" latinLnBrk="0" hangingPunct="1">
+              <a:lnSpc>
+                <a:spcPct val="100000"/>
+              </a:lnSpc>
+              <a:spcBef>
+                <a:spcPts val="0"/>
+              </a:spcBef>
+              <a:spcAft>
+                <a:spcPts val="0"/>
+              </a:spcAft>
+              <a:buClrTx/>
+              <a:buSzTx/>
+              <a:buFontTx/>
+              <a:buNone/>
+              <a:tabLst/>
+              <a:defRPr/>
+            </a:pPr>
+            <a:r>
+              <a:rPr lang="en-US" sz="1100" dirty="0" smtClean="0">
+                <a:solidFill>
+                  <a:prstClr val="white"/>
+                </a:solidFill>
+                <a:latin typeface="Mulish Light"/>
+              </a:rPr>
+              <a:t>0,073</a:t>
+            </a:r>
+            <a:endParaRPr kumimoji="0" lang="en-US" sz="1100" b="0" i="0" u="none" strike="noStrike" kern="1200" cap="none" spc="0" normalizeH="0" baseline="0" noProof="0" dirty="0" smtClean="0">
+              <a:ln>
+                <a:noFill/>
+              </a:ln>
+              <a:solidFill>
+                <a:prstClr val="white"/>
+              </a:solidFill>
+              <a:effectLst/>
+              <a:uLnTx/>
+              <a:uFillTx/>
+              <a:latin typeface="Mulish Light"/>
+              <a:ea typeface="+mn-ea"/>
+              <a:cs typeface="+mn-cs"/>
+            </a:endParaRPr>
+          </a:p>
+        </p:txBody>
+      </p:sp>
+      <p:sp>
+        <p:nvSpPr>
+          <p:cNvPr id="43" name="Rechteck 42">
+            <a:extLst>
+              <a:ext uri="{FF2B5EF4-FFF2-40B4-BE49-F238E27FC236}">
+                <a16:creationId xmlns:a16="http://schemas.microsoft.com/office/drawing/2014/main" id="{A0036FF7-A0A3-43F2-B836-5A8A67D584BA}"/>
+              </a:ext>
+            </a:extLst>
+          </p:cNvPr>
+          <p:cNvSpPr/>
+          <p:nvPr/>
+        </p:nvSpPr>
+        <p:spPr>
+          <a:xfrm>
+            <a:off x="6965037" y="3814877"/>
+            <a:ext cx="597131" cy="514781"/>
+          </a:xfrm>
+          <a:prstGeom prst="rect">
+            <a:avLst/>
+          </a:prstGeom>
+          <a:solidFill>
+            <a:srgbClr val="E6BA00"/>
+          </a:solidFill>
+          <a:ln>
+            <a:noFill/>
+          </a:ln>
+        </p:spPr>
+        <p:style>
+          <a:lnRef idx="2">
+            <a:schemeClr val="accent1">
+              <a:shade val="50000"/>
+            </a:schemeClr>
+          </a:lnRef>
+          <a:fillRef idx="1">
+            <a:schemeClr val="accent1"/>
+          </a:fillRef>
+          <a:effectRef idx="0">
+            <a:schemeClr val="accent1"/>
+          </a:effectRef>
+          <a:fontRef idx="minor">
+            <a:schemeClr val="lt1"/>
+          </a:fontRef>
+        </p:style>
+        <p:txBody>
+          <a:bodyPr rot="0" spcFirstLastPara="0" vertOverflow="overflow" horzOverflow="overflow" vert="horz" wrap="square" lIns="91440" tIns="45720" rIns="91440" bIns="45720" numCol="1" spcCol="0" rtlCol="0" fromWordArt="0" anchor="ctr" anchorCtr="0" forceAA="0" compatLnSpc="1">
+            <a:prstTxWarp prst="textNoShape">
+              <a:avLst/>
+            </a:prstTxWarp>
+            <a:noAutofit/>
+          </a:bodyPr>
+          <a:lstStyle/>
+          <a:p>
+            <a:pPr marL="0" marR="0" lvl="0" indent="0" algn="l" defTabSz="914400" rtl="0" eaLnBrk="1" fontAlgn="auto" latinLnBrk="0" hangingPunct="1">
+              <a:lnSpc>
+                <a:spcPct val="100000"/>
+              </a:lnSpc>
+              <a:spcBef>
+                <a:spcPts val="0"/>
+              </a:spcBef>
+              <a:spcAft>
+                <a:spcPts val="0"/>
+              </a:spcAft>
+              <a:buClrTx/>
+              <a:buSzTx/>
+              <a:buFontTx/>
+              <a:buNone/>
+              <a:tabLst/>
+              <a:defRPr/>
+            </a:pPr>
+            <a:r>
+              <a:rPr kumimoji="0" lang="de-DE" sz="1100" b="0" i="0" u="none" strike="noStrike" kern="1200" cap="none" spc="0" normalizeH="0" baseline="0" noProof="0" dirty="0" smtClean="0">
+                <a:ln>
+                  <a:noFill/>
+                </a:ln>
+                <a:solidFill>
+                  <a:prstClr val="white"/>
+                </a:solidFill>
+                <a:effectLst/>
+                <a:uLnTx/>
+                <a:uFillTx/>
+                <a:latin typeface="Mulish Light"/>
+                <a:ea typeface="+mn-ea"/>
+                <a:cs typeface="+mn-cs"/>
+              </a:rPr>
+              <a:t>0,065</a:t>
+            </a:r>
+            <a:endParaRPr kumimoji="0" lang="de-DE" sz="1100" b="0" i="0" u="none" strike="noStrike" kern="1200" cap="none" spc="0" normalizeH="0" baseline="0" noProof="0" dirty="0" smtClean="0">
+              <a:ln>
+                <a:noFill/>
+              </a:ln>
+              <a:solidFill>
+                <a:prstClr val="white"/>
+              </a:solidFill>
+              <a:effectLst/>
+              <a:uLnTx/>
+              <a:uFillTx/>
+              <a:latin typeface="Mulish Light"/>
+              <a:ea typeface="+mn-ea"/>
+              <a:cs typeface="+mn-cs"/>
+            </a:endParaRPr>
+          </a:p>
+          <a:p>
+            <a:pPr marL="0" marR="0" lvl="0" indent="0" algn="l" defTabSz="914400" rtl="0" eaLnBrk="1" fontAlgn="auto" latinLnBrk="0" hangingPunct="1">
+              <a:lnSpc>
+                <a:spcPct val="100000"/>
+              </a:lnSpc>
+              <a:spcBef>
+                <a:spcPts val="0"/>
+              </a:spcBef>
+              <a:spcAft>
+                <a:spcPts val="0"/>
+              </a:spcAft>
+              <a:buClrTx/>
+              <a:buSzTx/>
+              <a:buFontTx/>
+              <a:buNone/>
+              <a:tabLst/>
+              <a:defRPr/>
+            </a:pPr>
+            <a:r>
+              <a:rPr kumimoji="0" lang="de-DE" sz="1100" b="0" i="0" u="none" strike="noStrike" kern="1200" cap="none" spc="0" normalizeH="0" baseline="0" noProof="0" dirty="0" smtClean="0">
+                <a:ln>
+                  <a:noFill/>
+                </a:ln>
+                <a:solidFill>
+                  <a:prstClr val="white"/>
+                </a:solidFill>
+                <a:effectLst/>
+                <a:uLnTx/>
+                <a:uFillTx/>
+                <a:latin typeface="Mulish Light"/>
+                <a:ea typeface="+mn-ea"/>
+                <a:cs typeface="+mn-cs"/>
+              </a:rPr>
+              <a:t>0,026</a:t>
+            </a:r>
+            <a:endParaRPr kumimoji="0" lang="en-US" sz="1100" b="0" i="0" u="none" strike="noStrike" kern="1200" cap="none" spc="0" normalizeH="0" baseline="0" noProof="0" dirty="0" smtClean="0">
+              <a:ln>
+                <a:noFill/>
+              </a:ln>
+              <a:solidFill>
+                <a:prstClr val="white"/>
+              </a:solidFill>
+              <a:effectLst/>
+              <a:uLnTx/>
+              <a:uFillTx/>
+              <a:latin typeface="Mulish Light"/>
+              <a:ea typeface="+mn-ea"/>
+              <a:cs typeface="+mn-cs"/>
+            </a:endParaRPr>
+          </a:p>
+        </p:txBody>
+      </p:sp>
+      <p:sp>
+        <p:nvSpPr>
+          <p:cNvPr id="44" name="Rechteck 43">
+            <a:extLst>
+              <a:ext uri="{FF2B5EF4-FFF2-40B4-BE49-F238E27FC236}">
+                <a16:creationId xmlns:a16="http://schemas.microsoft.com/office/drawing/2014/main" id="{A0036FF7-A0A3-43F2-B836-5A8A67D584BA}"/>
+              </a:ext>
+            </a:extLst>
+          </p:cNvPr>
+          <p:cNvSpPr/>
+          <p:nvPr/>
+        </p:nvSpPr>
+        <p:spPr>
+          <a:xfrm>
+            <a:off x="7644268" y="1731943"/>
+            <a:ext cx="723114" cy="830319"/>
+          </a:xfrm>
+          <a:prstGeom prst="rect">
+            <a:avLst/>
+          </a:prstGeom>
+          <a:solidFill>
+            <a:schemeClr val="accent1">
+              <a:lumMod val="75000"/>
+            </a:schemeClr>
+          </a:solidFill>
+          <a:ln>
+            <a:noFill/>
+          </a:ln>
+        </p:spPr>
+        <p:style>
+          <a:lnRef idx="2">
+            <a:schemeClr val="accent1">
+              <a:shade val="50000"/>
+            </a:schemeClr>
+          </a:lnRef>
+          <a:fillRef idx="1">
+            <a:schemeClr val="accent1"/>
+          </a:fillRef>
+          <a:effectRef idx="0">
+            <a:schemeClr val="accent1"/>
+          </a:effectRef>
+          <a:fontRef idx="minor">
+            <a:schemeClr val="lt1"/>
+          </a:fontRef>
+        </p:style>
+        <p:txBody>
+          <a:bodyPr rot="0" spcFirstLastPara="0" vertOverflow="overflow" horzOverflow="overflow" vert="horz" wrap="square" lIns="91440" tIns="45720" rIns="91440" bIns="45720" numCol="1" spcCol="0" rtlCol="0" fromWordArt="0" anchor="ctr" anchorCtr="0" forceAA="0" compatLnSpc="1">
+            <a:prstTxWarp prst="textNoShape">
+              <a:avLst/>
+            </a:prstTxWarp>
+            <a:noAutofit/>
+          </a:bodyPr>
+          <a:lstStyle/>
+          <a:p>
+            <a:pPr marL="0" marR="0" lvl="0" indent="0" algn="l" defTabSz="914400" rtl="0" eaLnBrk="1" fontAlgn="auto" latinLnBrk="0" hangingPunct="1">
+              <a:lnSpc>
+                <a:spcPct val="100000"/>
+              </a:lnSpc>
+              <a:spcBef>
+                <a:spcPts val="0"/>
+              </a:spcBef>
+              <a:spcAft>
+                <a:spcPts val="0"/>
+              </a:spcAft>
+              <a:buClrTx/>
+              <a:buSzTx/>
+              <a:buFontTx/>
+              <a:buNone/>
+              <a:tabLst/>
+              <a:defRPr/>
+            </a:pPr>
+            <a:r>
+              <a:rPr kumimoji="0" lang="de-DE" sz="1100" b="0" i="0" u="none" strike="noStrike" kern="1200" cap="none" spc="0" normalizeH="0" baseline="0" noProof="0" dirty="0" smtClean="0">
+                <a:ln>
+                  <a:noFill/>
+                </a:ln>
+                <a:solidFill>
+                  <a:prstClr val="white"/>
+                </a:solidFill>
+                <a:effectLst/>
+                <a:uLnTx/>
+                <a:uFillTx/>
+                <a:latin typeface="Mulish Light"/>
+                <a:ea typeface="+mn-ea"/>
+                <a:cs typeface="+mn-cs"/>
+              </a:rPr>
+              <a:t>∑ </a:t>
+            </a:r>
+            <a:r>
+              <a:rPr kumimoji="0" lang="de-DE" sz="1100" b="0" i="0" u="none" strike="noStrike" kern="1200" cap="none" spc="0" normalizeH="0" baseline="0" noProof="0" dirty="0" smtClean="0">
+                <a:ln>
+                  <a:noFill/>
+                </a:ln>
+                <a:solidFill>
+                  <a:prstClr val="white"/>
+                </a:solidFill>
+                <a:effectLst/>
+                <a:uLnTx/>
+                <a:uFillTx/>
+                <a:latin typeface="Mulish Light"/>
+                <a:ea typeface="+mn-ea"/>
+                <a:cs typeface="+mn-cs"/>
+              </a:rPr>
+              <a:t>0,182</a:t>
+            </a:r>
+            <a:endParaRPr kumimoji="0" lang="en-US" sz="1100" b="0" i="0" u="none" strike="noStrike" kern="1200" cap="none" spc="0" normalizeH="0" baseline="0" noProof="0" dirty="0" smtClean="0">
+              <a:ln>
+                <a:noFill/>
+              </a:ln>
+              <a:solidFill>
+                <a:prstClr val="white"/>
+              </a:solidFill>
+              <a:effectLst/>
+              <a:uLnTx/>
+              <a:uFillTx/>
+              <a:latin typeface="Mulish Light"/>
+              <a:ea typeface="+mn-ea"/>
+              <a:cs typeface="+mn-cs"/>
+            </a:endParaRPr>
+          </a:p>
+        </p:txBody>
+      </p:sp>
+      <p:sp>
+        <p:nvSpPr>
+          <p:cNvPr id="45" name="Rechteck 44">
+            <a:extLst>
+              <a:ext uri="{FF2B5EF4-FFF2-40B4-BE49-F238E27FC236}">
+                <a16:creationId xmlns:a16="http://schemas.microsoft.com/office/drawing/2014/main" id="{A0036FF7-A0A3-43F2-B836-5A8A67D584BA}"/>
+              </a:ext>
+            </a:extLst>
+          </p:cNvPr>
+          <p:cNvSpPr/>
+          <p:nvPr/>
+        </p:nvSpPr>
+        <p:spPr>
+          <a:xfrm>
+            <a:off x="7644268" y="2635826"/>
+            <a:ext cx="723114" cy="1096204"/>
+          </a:xfrm>
+          <a:prstGeom prst="rect">
+            <a:avLst/>
+          </a:prstGeom>
+          <a:solidFill>
+            <a:srgbClr val="800000"/>
+          </a:solidFill>
+          <a:ln>
+            <a:noFill/>
+          </a:ln>
+        </p:spPr>
+        <p:style>
+          <a:lnRef idx="2">
+            <a:schemeClr val="accent1">
+              <a:shade val="50000"/>
+            </a:schemeClr>
+          </a:lnRef>
+          <a:fillRef idx="1">
+            <a:schemeClr val="accent1"/>
+          </a:fillRef>
+          <a:effectRef idx="0">
+            <a:schemeClr val="accent1"/>
+          </a:effectRef>
+          <a:fontRef idx="minor">
+            <a:schemeClr val="lt1"/>
+          </a:fontRef>
+        </p:style>
+        <p:txBody>
+          <a:bodyPr rot="0" spcFirstLastPara="0" vertOverflow="overflow" horzOverflow="overflow" vert="horz" wrap="square" lIns="91440" tIns="45720" rIns="91440" bIns="45720" numCol="1" spcCol="0" rtlCol="0" fromWordArt="0" anchor="ctr" anchorCtr="0" forceAA="0" compatLnSpc="1">
+            <a:prstTxWarp prst="textNoShape">
+              <a:avLst/>
+            </a:prstTxWarp>
+            <a:noAutofit/>
+          </a:bodyPr>
+          <a:lstStyle/>
+          <a:p>
+            <a:pPr marL="0" marR="0" lvl="0" indent="0" algn="l" defTabSz="914400" rtl="0" eaLnBrk="1" fontAlgn="auto" latinLnBrk="0" hangingPunct="1">
+              <a:lnSpc>
+                <a:spcPct val="100000"/>
+              </a:lnSpc>
+              <a:spcBef>
+                <a:spcPts val="0"/>
+              </a:spcBef>
+              <a:spcAft>
+                <a:spcPts val="0"/>
+              </a:spcAft>
+              <a:buClrTx/>
+              <a:buSzTx/>
+              <a:buFontTx/>
+              <a:buNone/>
+              <a:tabLst/>
+              <a:defRPr/>
+            </a:pPr>
+            <a:r>
+              <a:rPr kumimoji="0" lang="de-DE" sz="1100" b="0" i="0" u="none" strike="noStrike" kern="1200" cap="none" spc="0" normalizeH="0" baseline="0" noProof="0" dirty="0" smtClean="0">
+                <a:ln>
+                  <a:noFill/>
+                </a:ln>
+                <a:solidFill>
+                  <a:prstClr val="white"/>
+                </a:solidFill>
+                <a:effectLst/>
+                <a:uLnTx/>
+                <a:uFillTx/>
+                <a:latin typeface="Mulish Light"/>
+                <a:ea typeface="+mn-ea"/>
+                <a:cs typeface="+mn-cs"/>
+              </a:rPr>
+              <a:t>∑ 0,273</a:t>
+            </a:r>
+            <a:endParaRPr kumimoji="0" lang="en-US" sz="1100" b="0" i="0" u="none" strike="noStrike" kern="1200" cap="none" spc="0" normalizeH="0" baseline="0" noProof="0" dirty="0" smtClean="0">
+              <a:ln>
+                <a:noFill/>
+              </a:ln>
+              <a:solidFill>
+                <a:prstClr val="white"/>
+              </a:solidFill>
+              <a:effectLst/>
+              <a:uLnTx/>
+              <a:uFillTx/>
+              <a:latin typeface="Mulish Light"/>
+              <a:ea typeface="+mn-ea"/>
+              <a:cs typeface="+mn-cs"/>
+            </a:endParaRPr>
+          </a:p>
+        </p:txBody>
+      </p:sp>
+      <p:sp>
+        <p:nvSpPr>
+          <p:cNvPr id="46" name="Rechteck 45">
+            <a:extLst>
+              <a:ext uri="{FF2B5EF4-FFF2-40B4-BE49-F238E27FC236}">
+                <a16:creationId xmlns:a16="http://schemas.microsoft.com/office/drawing/2014/main" id="{A0036FF7-A0A3-43F2-B836-5A8A67D584BA}"/>
+              </a:ext>
+            </a:extLst>
+          </p:cNvPr>
+          <p:cNvSpPr/>
+          <p:nvPr/>
+        </p:nvSpPr>
+        <p:spPr>
+          <a:xfrm>
+            <a:off x="7644268" y="3814875"/>
+            <a:ext cx="723114" cy="514783"/>
+          </a:xfrm>
+          <a:prstGeom prst="rect">
+            <a:avLst/>
+          </a:prstGeom>
+          <a:solidFill>
+            <a:srgbClr val="E6BA00"/>
+          </a:solidFill>
+          <a:ln>
+            <a:noFill/>
+          </a:ln>
+        </p:spPr>
+        <p:style>
+          <a:lnRef idx="2">
+            <a:schemeClr val="accent1">
+              <a:shade val="50000"/>
+            </a:schemeClr>
+          </a:lnRef>
+          <a:fillRef idx="1">
+            <a:schemeClr val="accent1"/>
+          </a:fillRef>
+          <a:effectRef idx="0">
+            <a:schemeClr val="accent1"/>
+          </a:effectRef>
+          <a:fontRef idx="minor">
+            <a:schemeClr val="lt1"/>
+          </a:fontRef>
+        </p:style>
+        <p:txBody>
+          <a:bodyPr rot="0" spcFirstLastPara="0" vertOverflow="overflow" horzOverflow="overflow" vert="horz" wrap="square" lIns="91440" tIns="45720" rIns="91440" bIns="45720" numCol="1" spcCol="0" rtlCol="0" fromWordArt="0" anchor="ctr" anchorCtr="0" forceAA="0" compatLnSpc="1">
+            <a:prstTxWarp prst="textNoShape">
+              <a:avLst/>
+            </a:prstTxWarp>
+            <a:noAutofit/>
+          </a:bodyPr>
+          <a:lstStyle/>
+          <a:p>
+            <a:pPr marL="0" marR="0" lvl="0" indent="0" algn="l" defTabSz="914400" rtl="0" eaLnBrk="1" fontAlgn="auto" latinLnBrk="0" hangingPunct="1">
+              <a:lnSpc>
+                <a:spcPct val="100000"/>
+              </a:lnSpc>
+              <a:spcBef>
+                <a:spcPts val="0"/>
+              </a:spcBef>
+              <a:spcAft>
+                <a:spcPts val="0"/>
+              </a:spcAft>
+              <a:buClrTx/>
+              <a:buSzTx/>
+              <a:buFontTx/>
+              <a:buNone/>
+              <a:tabLst/>
+              <a:defRPr/>
+            </a:pPr>
+            <a:r>
+              <a:rPr kumimoji="0" lang="de-DE" sz="1100" b="0" i="0" u="none" strike="noStrike" kern="1200" cap="none" spc="0" normalizeH="0" baseline="0" noProof="0" dirty="0" smtClean="0">
+                <a:ln>
+                  <a:noFill/>
+                </a:ln>
+                <a:solidFill>
+                  <a:prstClr val="white"/>
+                </a:solidFill>
+                <a:effectLst/>
+                <a:uLnTx/>
+                <a:uFillTx/>
+                <a:latin typeface="Mulish Light"/>
+                <a:ea typeface="+mn-ea"/>
+                <a:cs typeface="+mn-cs"/>
+              </a:rPr>
+              <a:t>∑ </a:t>
+            </a:r>
+            <a:r>
+              <a:rPr kumimoji="0" lang="de-DE" sz="1100" b="0" i="0" u="none" strike="noStrike" kern="1200" cap="none" spc="0" normalizeH="0" baseline="0" noProof="0" dirty="0" smtClean="0">
+                <a:ln>
+                  <a:noFill/>
+                </a:ln>
+                <a:solidFill>
+                  <a:prstClr val="white"/>
+                </a:solidFill>
+                <a:effectLst/>
+                <a:uLnTx/>
+                <a:uFillTx/>
+                <a:latin typeface="Mulish Light"/>
+                <a:ea typeface="+mn-ea"/>
+                <a:cs typeface="+mn-cs"/>
+              </a:rPr>
+              <a:t>0,091</a:t>
+            </a:r>
+            <a:endParaRPr kumimoji="0" lang="en-US" sz="1100" b="0" i="0" u="none" strike="noStrike" kern="1200" cap="none" spc="0" normalizeH="0" baseline="0" noProof="0" dirty="0" smtClean="0">
+              <a:ln>
+                <a:noFill/>
+              </a:ln>
+              <a:solidFill>
+                <a:prstClr val="white"/>
+              </a:solidFill>
+              <a:effectLst/>
+              <a:uLnTx/>
+              <a:uFillTx/>
+              <a:latin typeface="Mulish Light"/>
+              <a:ea typeface="+mn-ea"/>
+              <a:cs typeface="+mn-cs"/>
+            </a:endParaRPr>
+          </a:p>
+        </p:txBody>
+      </p:sp>
+      <p:sp>
+        <p:nvSpPr>
+          <p:cNvPr id="47" name="Rechteck 46">
+            <a:extLst>
+              <a:ext uri="{FF2B5EF4-FFF2-40B4-BE49-F238E27FC236}">
+                <a16:creationId xmlns:a16="http://schemas.microsoft.com/office/drawing/2014/main" id="{A0036FF7-A0A3-43F2-B836-5A8A67D584BA}"/>
+              </a:ext>
+            </a:extLst>
+          </p:cNvPr>
+          <p:cNvSpPr/>
+          <p:nvPr/>
+        </p:nvSpPr>
+        <p:spPr>
+          <a:xfrm>
+            <a:off x="6965037" y="5025514"/>
+            <a:ext cx="597131" cy="551246"/>
+          </a:xfrm>
+          <a:prstGeom prst="rect">
+            <a:avLst/>
+          </a:prstGeom>
+          <a:solidFill>
+            <a:srgbClr val="4472C4"/>
+          </a:solidFill>
+          <a:ln>
+            <a:noFill/>
+          </a:ln>
+        </p:spPr>
+        <p:style>
+          <a:lnRef idx="2">
+            <a:schemeClr val="accent1">
+              <a:shade val="50000"/>
+            </a:schemeClr>
+          </a:lnRef>
+          <a:fillRef idx="1">
+            <a:schemeClr val="accent1"/>
+          </a:fillRef>
+          <a:effectRef idx="0">
+            <a:schemeClr val="accent1"/>
+          </a:effectRef>
+          <a:fontRef idx="minor">
+            <a:schemeClr val="lt1"/>
+          </a:fontRef>
+        </p:style>
+        <p:txBody>
+          <a:bodyPr rot="0" spcFirstLastPara="0" vertOverflow="overflow" horzOverflow="overflow" vert="horz" wrap="square" lIns="91440" tIns="45720" rIns="91440" bIns="45720" numCol="1" spcCol="0" rtlCol="0" fromWordArt="0" anchor="ctr" anchorCtr="0" forceAA="0" compatLnSpc="1">
+            <a:prstTxWarp prst="textNoShape">
+              <a:avLst/>
+            </a:prstTxWarp>
+            <a:noAutofit/>
+          </a:bodyPr>
+          <a:lstStyle/>
+          <a:p>
+            <a:pPr marL="0" marR="0" lvl="0" indent="0" algn="l" defTabSz="914400" rtl="0" eaLnBrk="1" fontAlgn="auto" latinLnBrk="0" hangingPunct="1">
+              <a:lnSpc>
+                <a:spcPct val="100000"/>
+              </a:lnSpc>
+              <a:spcBef>
+                <a:spcPts val="0"/>
+              </a:spcBef>
+              <a:spcAft>
+                <a:spcPts val="0"/>
+              </a:spcAft>
+              <a:buClrTx/>
+              <a:buSzTx/>
+              <a:buFontTx/>
+              <a:buNone/>
+              <a:tabLst/>
+              <a:defRPr/>
+            </a:pPr>
+            <a:r>
+              <a:rPr kumimoji="0" lang="de-DE" sz="1100" b="0" i="0" u="none" strike="noStrike" kern="1200" cap="none" spc="0" normalizeH="0" baseline="0" noProof="0" dirty="0" smtClean="0">
+                <a:ln>
+                  <a:noFill/>
+                </a:ln>
+                <a:solidFill>
+                  <a:prstClr val="white"/>
+                </a:solidFill>
+                <a:effectLst/>
+                <a:uLnTx/>
+                <a:uFillTx/>
+                <a:latin typeface="Mulish Light"/>
+                <a:ea typeface="+mn-ea"/>
+                <a:cs typeface="+mn-cs"/>
+              </a:rPr>
+              <a:t>0,182</a:t>
+            </a:r>
+            <a:endParaRPr kumimoji="0" lang="en-US" sz="1100" b="0" i="0" u="none" strike="noStrike" kern="1200" cap="none" spc="0" normalizeH="0" baseline="0" noProof="0" dirty="0" smtClean="0">
+              <a:ln>
+                <a:noFill/>
+              </a:ln>
+              <a:solidFill>
+                <a:prstClr val="white"/>
+              </a:solidFill>
+              <a:effectLst/>
+              <a:uLnTx/>
+              <a:uFillTx/>
+              <a:latin typeface="Mulish Light"/>
+              <a:ea typeface="+mn-ea"/>
+              <a:cs typeface="+mn-cs"/>
+            </a:endParaRPr>
+          </a:p>
+        </p:txBody>
+      </p:sp>
+      <p:sp>
+        <p:nvSpPr>
+          <p:cNvPr id="48" name="Rechteck 47">
+            <a:extLst>
+              <a:ext uri="{FF2B5EF4-FFF2-40B4-BE49-F238E27FC236}">
+                <a16:creationId xmlns:a16="http://schemas.microsoft.com/office/drawing/2014/main" id="{A0036FF7-A0A3-43F2-B836-5A8A67D584BA}"/>
+              </a:ext>
+            </a:extLst>
+          </p:cNvPr>
+          <p:cNvSpPr/>
+          <p:nvPr/>
+        </p:nvSpPr>
+        <p:spPr>
+          <a:xfrm>
+            <a:off x="7644268" y="5025512"/>
+            <a:ext cx="723114" cy="551248"/>
+          </a:xfrm>
+          <a:prstGeom prst="rect">
+            <a:avLst/>
+          </a:prstGeom>
+          <a:solidFill>
+            <a:schemeClr val="accent6"/>
+          </a:solidFill>
+          <a:ln>
+            <a:noFill/>
+          </a:ln>
+        </p:spPr>
+        <p:style>
+          <a:lnRef idx="2">
+            <a:schemeClr val="accent1">
+              <a:shade val="50000"/>
+            </a:schemeClr>
+          </a:lnRef>
+          <a:fillRef idx="1">
+            <a:schemeClr val="accent1"/>
+          </a:fillRef>
+          <a:effectRef idx="0">
+            <a:schemeClr val="accent1"/>
+          </a:effectRef>
+          <a:fontRef idx="minor">
+            <a:schemeClr val="lt1"/>
+          </a:fontRef>
+        </p:style>
+        <p:txBody>
+          <a:bodyPr rot="0" spcFirstLastPara="0" vertOverflow="overflow" horzOverflow="overflow" vert="horz" wrap="square" lIns="91440" tIns="45720" rIns="91440" bIns="45720" numCol="1" spcCol="0" rtlCol="0" fromWordArt="0" anchor="ctr" anchorCtr="0" forceAA="0" compatLnSpc="1">
+            <a:prstTxWarp prst="textNoShape">
+              <a:avLst/>
+            </a:prstTxWarp>
+            <a:noAutofit/>
+          </a:bodyPr>
+          <a:lstStyle/>
+          <a:p>
+            <a:pPr marL="0" marR="0" lvl="0" indent="0" algn="l" defTabSz="914400" rtl="0" eaLnBrk="1" fontAlgn="auto" latinLnBrk="0" hangingPunct="1">
+              <a:lnSpc>
+                <a:spcPct val="100000"/>
+              </a:lnSpc>
+              <a:spcBef>
+                <a:spcPts val="0"/>
+              </a:spcBef>
+              <a:spcAft>
+                <a:spcPts val="0"/>
+              </a:spcAft>
+              <a:buClrTx/>
+              <a:buSzTx/>
+              <a:buFontTx/>
+              <a:buNone/>
+              <a:tabLst/>
+              <a:defRPr/>
+            </a:pPr>
+            <a:r>
+              <a:rPr kumimoji="0" lang="de-DE" sz="1100" b="0" i="0" u="none" strike="noStrike" kern="1200" cap="none" spc="0" normalizeH="0" baseline="0" noProof="0" dirty="0" smtClean="0">
+                <a:ln>
+                  <a:noFill/>
+                </a:ln>
+                <a:solidFill>
+                  <a:prstClr val="white"/>
+                </a:solidFill>
+                <a:effectLst/>
+                <a:uLnTx/>
+                <a:uFillTx/>
+                <a:latin typeface="Mulish Light"/>
+                <a:ea typeface="+mn-ea"/>
+                <a:cs typeface="+mn-cs"/>
+              </a:rPr>
+              <a:t>∑ </a:t>
+            </a:r>
+            <a:r>
+              <a:rPr kumimoji="0" lang="de-DE" sz="1100" b="0" i="0" u="none" strike="noStrike" kern="1200" cap="none" spc="0" normalizeH="0" baseline="0" noProof="0" dirty="0" smtClean="0">
+                <a:ln>
+                  <a:noFill/>
+                </a:ln>
+                <a:solidFill>
+                  <a:prstClr val="white"/>
+                </a:solidFill>
+                <a:effectLst/>
+                <a:uLnTx/>
+                <a:uFillTx/>
+                <a:latin typeface="Mulish Light"/>
+                <a:ea typeface="+mn-ea"/>
+                <a:cs typeface="+mn-cs"/>
+              </a:rPr>
+              <a:t>0,182</a:t>
+            </a:r>
+            <a:endParaRPr kumimoji="0" lang="en-US" sz="1100" b="0" i="0" u="none" strike="noStrike" kern="1200" cap="none" spc="0" normalizeH="0" baseline="0" noProof="0" dirty="0" smtClean="0">
+              <a:ln>
+                <a:noFill/>
+              </a:ln>
+              <a:solidFill>
+                <a:prstClr val="white"/>
+              </a:solidFill>
+              <a:effectLst/>
+              <a:uLnTx/>
+              <a:uFillTx/>
+              <a:latin typeface="Mulish Light"/>
+              <a:ea typeface="+mn-ea"/>
+              <a:cs typeface="+mn-cs"/>
+            </a:endParaRPr>
+          </a:p>
+        </p:txBody>
+      </p:sp>
+      <p:sp>
+        <p:nvSpPr>
+          <p:cNvPr id="49" name="Rechteck 48">
+            <a:extLst>
+              <a:ext uri="{FF2B5EF4-FFF2-40B4-BE49-F238E27FC236}">
+                <a16:creationId xmlns:a16="http://schemas.microsoft.com/office/drawing/2014/main" id="{A0036FF7-A0A3-43F2-B836-5A8A67D584BA}"/>
+              </a:ext>
+            </a:extLst>
+          </p:cNvPr>
+          <p:cNvSpPr/>
+          <p:nvPr/>
+        </p:nvSpPr>
+        <p:spPr>
+          <a:xfrm>
+            <a:off x="6965037" y="5635669"/>
+            <a:ext cx="597131" cy="772626"/>
+          </a:xfrm>
+          <a:prstGeom prst="rect">
+            <a:avLst/>
+          </a:prstGeom>
+          <a:solidFill>
+            <a:srgbClr val="6A1371"/>
+          </a:solidFill>
+          <a:ln>
+            <a:noFill/>
+          </a:ln>
+        </p:spPr>
+        <p:style>
+          <a:lnRef idx="2">
+            <a:schemeClr val="accent1">
+              <a:shade val="50000"/>
+            </a:schemeClr>
+          </a:lnRef>
+          <a:fillRef idx="1">
+            <a:schemeClr val="accent1"/>
+          </a:fillRef>
+          <a:effectRef idx="0">
+            <a:schemeClr val="accent1"/>
+          </a:effectRef>
+          <a:fontRef idx="minor">
+            <a:schemeClr val="lt1"/>
+          </a:fontRef>
+        </p:style>
+        <p:txBody>
+          <a:bodyPr rot="0" spcFirstLastPara="0" vertOverflow="overflow" horzOverflow="overflow" vert="horz" wrap="square" lIns="91440" tIns="45720" rIns="91440" bIns="45720" numCol="1" spcCol="0" rtlCol="0" fromWordArt="0" anchor="ctr" anchorCtr="0" forceAA="0" compatLnSpc="1">
+            <a:prstTxWarp prst="textNoShape">
+              <a:avLst/>
+            </a:prstTxWarp>
+            <a:noAutofit/>
+          </a:bodyPr>
+          <a:lstStyle/>
+          <a:p>
+            <a:pPr marL="0" marR="0" lvl="0" indent="0" algn="l" defTabSz="914400" rtl="0" eaLnBrk="1" fontAlgn="auto" latinLnBrk="0" hangingPunct="1">
+              <a:lnSpc>
+                <a:spcPct val="100000"/>
+              </a:lnSpc>
+              <a:spcBef>
+                <a:spcPts val="0"/>
+              </a:spcBef>
+              <a:spcAft>
+                <a:spcPts val="0"/>
+              </a:spcAft>
+              <a:buClrTx/>
+              <a:buSzTx/>
+              <a:buFontTx/>
+              <a:buNone/>
+              <a:tabLst/>
+              <a:defRPr/>
+            </a:pPr>
+            <a:r>
+              <a:rPr kumimoji="0" lang="de-DE" sz="1100" b="0" i="0" u="none" strike="noStrike" kern="1200" cap="none" spc="0" normalizeH="0" baseline="0" noProof="0" dirty="0" smtClean="0">
+                <a:ln>
+                  <a:noFill/>
+                </a:ln>
+                <a:solidFill>
+                  <a:prstClr val="white"/>
+                </a:solidFill>
+                <a:effectLst/>
+                <a:uLnTx/>
+                <a:uFillTx/>
+                <a:latin typeface="Mulish Light"/>
+                <a:ea typeface="+mn-ea"/>
+                <a:cs typeface="+mn-cs"/>
+              </a:rPr>
+              <a:t>0,021</a:t>
+            </a:r>
+            <a:endParaRPr kumimoji="0" lang="de-DE" sz="1100" b="0" i="0" u="none" strike="noStrike" kern="1200" cap="none" spc="0" normalizeH="0" baseline="0" noProof="0" dirty="0" smtClean="0">
+              <a:ln>
+                <a:noFill/>
+              </a:ln>
+              <a:solidFill>
+                <a:prstClr val="white"/>
+              </a:solidFill>
+              <a:effectLst/>
+              <a:uLnTx/>
+              <a:uFillTx/>
+              <a:latin typeface="Mulish Light"/>
+              <a:ea typeface="+mn-ea"/>
+              <a:cs typeface="+mn-cs"/>
+            </a:endParaRPr>
+          </a:p>
+          <a:p>
+            <a:pPr marL="0" marR="0" lvl="0" indent="0" algn="l" defTabSz="914400" rtl="0" eaLnBrk="1" fontAlgn="auto" latinLnBrk="0" hangingPunct="1">
+              <a:lnSpc>
+                <a:spcPct val="100000"/>
+              </a:lnSpc>
+              <a:spcBef>
+                <a:spcPts val="0"/>
+              </a:spcBef>
+              <a:spcAft>
+                <a:spcPts val="0"/>
+              </a:spcAft>
+              <a:buClrTx/>
+              <a:buSzTx/>
+              <a:buFontTx/>
+              <a:buNone/>
+              <a:tabLst/>
+              <a:defRPr/>
+            </a:pPr>
+            <a:r>
+              <a:rPr kumimoji="0" lang="de-DE" sz="1100" b="0" i="0" u="none" strike="noStrike" kern="1200" cap="none" spc="0" normalizeH="0" baseline="0" noProof="0" dirty="0" smtClean="0">
+                <a:ln>
+                  <a:noFill/>
+                </a:ln>
+                <a:solidFill>
+                  <a:prstClr val="white"/>
+                </a:solidFill>
+                <a:effectLst/>
+                <a:uLnTx/>
+                <a:uFillTx/>
+                <a:latin typeface="Mulish Light"/>
+                <a:ea typeface="+mn-ea"/>
+                <a:cs typeface="+mn-cs"/>
+              </a:rPr>
+              <a:t>0,030 0,030 0,009</a:t>
+            </a:r>
+            <a:endParaRPr kumimoji="0" lang="de-DE" sz="1100" b="0" i="0" u="none" strike="noStrike" kern="1200" cap="none" spc="0" normalizeH="0" baseline="0" noProof="0" dirty="0" smtClean="0">
+              <a:ln>
+                <a:noFill/>
+              </a:ln>
+              <a:solidFill>
+                <a:prstClr val="white"/>
+              </a:solidFill>
+              <a:effectLst/>
+              <a:uLnTx/>
+              <a:uFillTx/>
+              <a:latin typeface="Mulish Light"/>
+              <a:ea typeface="+mn-ea"/>
+              <a:cs typeface="+mn-cs"/>
+            </a:endParaRPr>
+          </a:p>
+        </p:txBody>
+      </p:sp>
+      <p:sp>
+        <p:nvSpPr>
+          <p:cNvPr id="50" name="Rechteck 49">
+            <a:extLst>
+              <a:ext uri="{FF2B5EF4-FFF2-40B4-BE49-F238E27FC236}">
+                <a16:creationId xmlns:a16="http://schemas.microsoft.com/office/drawing/2014/main" id="{A0036FF7-A0A3-43F2-B836-5A8A67D584BA}"/>
+              </a:ext>
+            </a:extLst>
+          </p:cNvPr>
+          <p:cNvSpPr/>
+          <p:nvPr/>
+        </p:nvSpPr>
+        <p:spPr>
+          <a:xfrm>
+            <a:off x="7644268" y="5635669"/>
+            <a:ext cx="723114" cy="772626"/>
+          </a:xfrm>
+          <a:prstGeom prst="rect">
+            <a:avLst/>
+          </a:prstGeom>
+          <a:solidFill>
+            <a:srgbClr val="6A1371"/>
+          </a:solidFill>
+          <a:ln>
+            <a:noFill/>
+          </a:ln>
+        </p:spPr>
+        <p:style>
+          <a:lnRef idx="2">
+            <a:schemeClr val="accent1">
+              <a:shade val="50000"/>
+            </a:schemeClr>
+          </a:lnRef>
+          <a:fillRef idx="1">
+            <a:schemeClr val="accent1"/>
+          </a:fillRef>
+          <a:effectRef idx="0">
+            <a:schemeClr val="accent1"/>
+          </a:effectRef>
+          <a:fontRef idx="minor">
+            <a:schemeClr val="lt1"/>
+          </a:fontRef>
+        </p:style>
+        <p:txBody>
+          <a:bodyPr rot="0" spcFirstLastPara="0" vertOverflow="overflow" horzOverflow="overflow" vert="horz" wrap="square" lIns="91440" tIns="45720" rIns="91440" bIns="45720" numCol="1" spcCol="0" rtlCol="0" fromWordArt="0" anchor="ctr" anchorCtr="0" forceAA="0" compatLnSpc="1">
+            <a:prstTxWarp prst="textNoShape">
+              <a:avLst/>
+            </a:prstTxWarp>
+            <a:noAutofit/>
+          </a:bodyPr>
+          <a:lstStyle/>
+          <a:p>
+            <a:pPr marL="0" marR="0" lvl="0" indent="0" algn="l" defTabSz="914400" rtl="0" eaLnBrk="1" fontAlgn="auto" latinLnBrk="0" hangingPunct="1">
+              <a:lnSpc>
+                <a:spcPct val="100000"/>
+              </a:lnSpc>
+              <a:spcBef>
+                <a:spcPts val="0"/>
+              </a:spcBef>
+              <a:spcAft>
+                <a:spcPts val="0"/>
+              </a:spcAft>
+              <a:buClrTx/>
+              <a:buSzTx/>
+              <a:buFontTx/>
+              <a:buNone/>
+              <a:tabLst/>
+              <a:defRPr/>
+            </a:pPr>
+            <a:r>
+              <a:rPr kumimoji="0" lang="de-DE" sz="1100" b="0" i="0" u="none" strike="noStrike" kern="1200" cap="none" spc="0" normalizeH="0" baseline="0" noProof="0" dirty="0" smtClean="0">
+                <a:ln>
+                  <a:noFill/>
+                </a:ln>
+                <a:solidFill>
+                  <a:prstClr val="white"/>
+                </a:solidFill>
+                <a:effectLst/>
+                <a:uLnTx/>
+                <a:uFillTx/>
+                <a:latin typeface="Mulish Light"/>
+                <a:ea typeface="+mn-ea"/>
+                <a:cs typeface="+mn-cs"/>
+              </a:rPr>
+              <a:t>∑ </a:t>
+            </a:r>
+            <a:r>
+              <a:rPr kumimoji="0" lang="de-DE" sz="1100" b="0" i="0" u="none" strike="noStrike" kern="1200" cap="none" spc="0" normalizeH="0" baseline="0" noProof="0" dirty="0" smtClean="0">
+                <a:ln>
+                  <a:noFill/>
+                </a:ln>
+                <a:solidFill>
+                  <a:prstClr val="white"/>
+                </a:solidFill>
+                <a:effectLst/>
+                <a:uLnTx/>
+                <a:uFillTx/>
+                <a:latin typeface="Mulish Light"/>
+                <a:ea typeface="+mn-ea"/>
+                <a:cs typeface="+mn-cs"/>
+              </a:rPr>
+              <a:t>0,091</a:t>
+            </a:r>
+            <a:endParaRPr kumimoji="0" lang="en-US" sz="1100" b="0" i="0" u="none" strike="noStrike" kern="1200" cap="none" spc="0" normalizeH="0" baseline="0" noProof="0" dirty="0" smtClean="0">
+              <a:ln>
+                <a:noFill/>
+              </a:ln>
+              <a:solidFill>
+                <a:prstClr val="white"/>
+              </a:solidFill>
+              <a:effectLst/>
+              <a:uLnTx/>
+              <a:uFillTx/>
+              <a:latin typeface="Mulish Light"/>
+              <a:ea typeface="+mn-ea"/>
+              <a:cs typeface="+mn-cs"/>
+            </a:endParaRPr>
+          </a:p>
+        </p:txBody>
+      </p:sp>
+      <p:sp>
+        <p:nvSpPr>
+          <p:cNvPr id="51" name="Rechteck 50">
             <a:extLst>
               <a:ext uri="{FF2B5EF4-FFF2-40B4-BE49-F238E27FC236}">
                 <a16:creationId xmlns:a16="http://schemas.microsoft.com/office/drawing/2014/main" id="{A0036FF7-A0A3-43F2-B836-5A8A67D584BA}"/>
@@ -17857,7 +17969,7 @@
               <a:defRPr/>
             </a:pPr>
             <a:r>
-              <a:rPr kumimoji="0" lang="de-DE" sz="1100" b="0" i="0" u="none" strike="noStrike" kern="1200" cap="none" spc="0" normalizeH="0" baseline="0" noProof="0" dirty="0">
+              <a:rPr kumimoji="0" lang="de-DE" sz="1100" b="0" i="0" u="none" strike="noStrike" kern="1200" cap="none" spc="0" normalizeH="0" baseline="0" noProof="0" dirty="0" smtClean="0">
                 <a:ln>
                   <a:noFill/>
                 </a:ln>
@@ -17871,7 +17983,7 @@
                 <a:ea typeface="+mn-ea"/>
                 <a:cs typeface="+mn-cs"/>
               </a:rPr>
-              <a:t>0,047</a:t>
+              <a:t>0,061</a:t>
             </a:r>
           </a:p>
           <a:p>
@@ -17907,7 +18019,7 @@
                 <a:ea typeface="+mn-ea"/>
                 <a:cs typeface="+mn-cs"/>
               </a:rPr>
-              <a:t>0,047</a:t>
+              <a:t>0,061</a:t>
             </a:r>
             <a:endParaRPr kumimoji="0" lang="de-DE" sz="1100" b="0" i="0" u="none" strike="noStrike" kern="1200" cap="none" spc="0" normalizeH="0" baseline="0" noProof="0" dirty="0">
               <a:ln>
@@ -17957,7 +18069,7 @@
                 <a:ea typeface="+mn-ea"/>
                 <a:cs typeface="+mn-cs"/>
               </a:rPr>
-              <a:t>0,047</a:t>
+              <a:t>0,061</a:t>
             </a:r>
             <a:endParaRPr kumimoji="0" lang="en-US" sz="1100" b="0" i="0" u="none" strike="noStrike" kern="1200" cap="none" spc="0" normalizeH="0" baseline="0" noProof="0" dirty="0">
               <a:ln>
@@ -17978,7 +18090,7 @@
       </p:sp>
       <p:sp>
         <p:nvSpPr>
-          <p:cNvPr id="40" name="Rechteck 39">
+          <p:cNvPr id="52" name="Rechteck 51">
             <a:extLst>
               <a:ext uri="{FF2B5EF4-FFF2-40B4-BE49-F238E27FC236}">
                 <a16:creationId xmlns:a16="http://schemas.microsoft.com/office/drawing/2014/main" id="{A0036FF7-A0A3-43F2-B836-5A8A67D584BA}"/>
@@ -18060,7 +18172,24 @@
                 <a:ea typeface="+mn-ea"/>
                 <a:cs typeface="+mn-cs"/>
               </a:rPr>
-              <a:t>∑ 0,14</a:t>
+              <a:t>∑ </a:t>
+            </a:r>
+            <a:r>
+              <a:rPr kumimoji="0" lang="de-DE" sz="1100" b="0" i="0" u="none" strike="noStrike" kern="1200" cap="none" spc="0" normalizeH="0" baseline="0" noProof="0" dirty="0" smtClean="0">
+                <a:ln>
+                  <a:noFill/>
+                </a:ln>
+                <a:solidFill>
+                  <a:prstClr val="white"/>
+                </a:solidFill>
+                <a:effectLst/>
+                <a:uLnTx/>
+                <a:uFillTx/>
+                <a:latin typeface="Mulish Light"/>
+                <a:ea typeface="+mn-ea"/>
+                <a:cs typeface="+mn-cs"/>
+              </a:rPr>
+              <a:t>0,182</a:t>
             </a:r>
             <a:endParaRPr kumimoji="0" lang="en-US" sz="1100" b="0" i="0" u="none" strike="noStrike" kern="1200" cap="none" spc="0" normalizeH="0" baseline="0" noProof="0" dirty="0" smtClean="0">
               <a:ln>

</xml_diff>